<commit_message>
updating class 17 and 18
</commit_message>
<xml_diff>
--- a/public/18/SimpleLogisticRegression-PartII_v01.pptx
+++ b/public/18/SimpleLogisticRegression-PartII_v01.pptx
@@ -14,8 +14,8 @@
     <p:sldId id="560" r:id="rId2"/>
     <p:sldId id="496" r:id="rId3"/>
     <p:sldId id="557" r:id="rId4"/>
-    <p:sldId id="553" r:id="rId5"/>
-    <p:sldId id="562" r:id="rId6"/>
+    <p:sldId id="562" r:id="rId5"/>
+    <p:sldId id="553" r:id="rId6"/>
     <p:sldId id="520" r:id="rId7"/>
     <p:sldId id="527" r:id="rId8"/>
     <p:sldId id="529" r:id="rId9"/>
@@ -10155,7 +10155,7 @@
           <a:graphicData uri="http://schemas.openxmlformats.org/presentationml/2006/ole">
             <mc:AlternateContent xmlns:mc="http://schemas.openxmlformats.org/markup-compatibility/2006">
               <mc:Choice xmlns:v="urn:schemas-microsoft-com:vml" Requires="v">
-                <p:oleObj spid="_x0000_s40986" name="Equation" r:id="rId4" imgW="583947" imgH="507780" progId="Equation.DSMT4">
+                <p:oleObj spid="_x0000_s40988" name="Equation" r:id="rId4" imgW="583947" imgH="507780" progId="Equation.DSMT4">
                   <p:embed/>
                 </p:oleObj>
               </mc:Choice>
@@ -12469,7 +12469,7 @@
           <a:graphicData uri="http://schemas.openxmlformats.org/presentationml/2006/ole">
             <mc:AlternateContent xmlns:mc="http://schemas.openxmlformats.org/markup-compatibility/2006">
               <mc:Choice xmlns:v="urn:schemas-microsoft-com:vml" Requires="v">
-                <p:oleObj spid="_x0000_s43033" name="Equation" r:id="rId4" imgW="927100" imgH="254000" progId="Equation.DSMT4">
+                <p:oleObj spid="_x0000_s43035" name="Equation" r:id="rId4" imgW="927100" imgH="254000" progId="Equation.DSMT4">
                   <p:embed/>
                 </p:oleObj>
               </mc:Choice>
@@ -15292,7 +15292,7 @@
           <a:graphicData uri="http://schemas.openxmlformats.org/presentationml/2006/ole">
             <mc:AlternateContent xmlns:mc="http://schemas.openxmlformats.org/markup-compatibility/2006">
               <mc:Choice xmlns:v="urn:schemas-microsoft-com:vml" Requires="v">
-                <p:oleObj spid="_x0000_s46104" name="Equation" r:id="rId4" imgW="1256755" imgH="253890" progId="Equation.DSMT4">
+                <p:oleObj spid="_x0000_s46106" name="Equation" r:id="rId4" imgW="1256755" imgH="253890" progId="Equation.DSMT4">
                   <p:embed/>
                 </p:oleObj>
               </mc:Choice>
@@ -17494,7 +17494,7 @@
           <a:graphicData uri="http://schemas.openxmlformats.org/presentationml/2006/ole">
             <mc:AlternateContent xmlns:mc="http://schemas.openxmlformats.org/markup-compatibility/2006">
               <mc:Choice xmlns:v="urn:schemas-microsoft-com:vml" Requires="v">
-                <p:oleObj spid="_x0000_s113683" name="Equation" r:id="rId4" imgW="1206500" imgH="266700" progId="Equation.DSMT4">
+                <p:oleObj spid="_x0000_s113689" name="Equation" r:id="rId4" imgW="1206500" imgH="266700" progId="Equation.DSMT4">
                   <p:embed/>
                 </p:oleObj>
               </mc:Choice>
@@ -18355,7 +18355,7 @@
           <a:graphicData uri="http://schemas.openxmlformats.org/presentationml/2006/ole">
             <mc:AlternateContent xmlns:mc="http://schemas.openxmlformats.org/markup-compatibility/2006">
               <mc:Choice xmlns:v="urn:schemas-microsoft-com:vml" Requires="v">
-                <p:oleObj spid="_x0000_s113684" name="Equation" r:id="rId6" imgW="927100" imgH="241300" progId="Equation.DSMT4">
+                <p:oleObj spid="_x0000_s113690" name="Equation" r:id="rId6" imgW="927100" imgH="241300" progId="Equation.DSMT4">
                   <p:embed/>
                 </p:oleObj>
               </mc:Choice>
@@ -18630,7 +18630,7 @@
           <a:graphicData uri="http://schemas.openxmlformats.org/presentationml/2006/ole">
             <mc:AlternateContent xmlns:mc="http://schemas.openxmlformats.org/markup-compatibility/2006">
               <mc:Choice xmlns:v="urn:schemas-microsoft-com:vml" Requires="v">
-                <p:oleObj spid="_x0000_s113685" name="Equation" r:id="rId8" imgW="469900" imgH="419100" progId="Equation.DSMT4">
+                <p:oleObj spid="_x0000_s113691" name="Equation" r:id="rId8" imgW="469900" imgH="419100" progId="Equation.DSMT4">
                   <p:embed/>
                 </p:oleObj>
               </mc:Choice>
@@ -22450,7 +22450,7 @@
           <a:graphicData uri="http://schemas.openxmlformats.org/presentationml/2006/ole">
             <mc:AlternateContent xmlns:mc="http://schemas.openxmlformats.org/markup-compatibility/2006">
               <mc:Choice xmlns:v="urn:schemas-microsoft-com:vml" Requires="v">
-                <p:oleObj spid="_x0000_s64562" name="Equation" r:id="rId4" imgW="990170" imgH="431613" progId="Equation.3">
+                <p:oleObj spid="_x0000_s64568" name="Equation" r:id="rId4" imgW="990170" imgH="431613" progId="Equation.3">
                   <p:embed/>
                 </p:oleObj>
               </mc:Choice>
@@ -22756,7 +22756,7 @@
           <a:graphicData uri="http://schemas.openxmlformats.org/presentationml/2006/ole">
             <mc:AlternateContent xmlns:mc="http://schemas.openxmlformats.org/markup-compatibility/2006">
               <mc:Choice xmlns:v="urn:schemas-microsoft-com:vml" Requires="v">
-                <p:oleObj spid="_x0000_s64563" name="Equation" r:id="rId6" imgW="1397000" imgH="431800" progId="Equation.3">
+                <p:oleObj spid="_x0000_s64569" name="Equation" r:id="rId6" imgW="1397000" imgH="431800" progId="Equation.3">
                   <p:embed/>
                 </p:oleObj>
               </mc:Choice>
@@ -23640,7 +23640,7 @@
           <a:graphicData uri="http://schemas.openxmlformats.org/presentationml/2006/ole">
             <mc:AlternateContent xmlns:mc="http://schemas.openxmlformats.org/markup-compatibility/2006">
               <mc:Choice xmlns:v="urn:schemas-microsoft-com:vml" Requires="v">
-                <p:oleObj spid="_x0000_s64564" name="Equation" r:id="rId8" imgW="1981200" imgH="203200" progId="Equation.DSMT4">
+                <p:oleObj spid="_x0000_s64570" name="Equation" r:id="rId8" imgW="1981200" imgH="203200" progId="Equation.DSMT4">
                   <p:embed/>
                 </p:oleObj>
               </mc:Choice>
@@ -24701,8 +24701,8 @@
           <a:chExt cx="0" cy="0"/>
         </a:xfrm>
       </p:grpSpPr>
-      <mc:AlternateContent xmlns:mc="http://schemas.openxmlformats.org/markup-compatibility/2006">
-        <mc:Choice xmlns:a14="http://schemas.microsoft.com/office/drawing/2010/main" Requires="a14">
+      <mc:AlternateContent xmlns:mc="http://schemas.openxmlformats.org/markup-compatibility/2006" xmlns:a14="http://schemas.microsoft.com/office/drawing/2010/main">
+        <mc:Choice Requires="a14">
           <p:sp>
             <p:nvSpPr>
               <p:cNvPr id="2" name="TextBox 1"/>
@@ -24809,7 +24809,7 @@
             </p:txBody>
           </p:sp>
         </mc:Choice>
-        <mc:Fallback>
+        <mc:Fallback xmlns="">
           <p:sp>
             <p:nvSpPr>
               <p:cNvPr id="2" name="TextBox 1"/>
@@ -24848,8 +24848,8 @@
           </p:sp>
         </mc:Fallback>
       </mc:AlternateContent>
-      <mc:AlternateContent xmlns:mc="http://schemas.openxmlformats.org/markup-compatibility/2006">
-        <mc:Choice xmlns:a14="http://schemas.microsoft.com/office/drawing/2010/main" Requires="a14">
+      <mc:AlternateContent xmlns:mc="http://schemas.openxmlformats.org/markup-compatibility/2006" xmlns:a14="http://schemas.microsoft.com/office/drawing/2010/main">
+        <mc:Choice Requires="a14">
           <p:sp>
             <p:nvSpPr>
               <p:cNvPr id="10" name="TextBox 9"/>
@@ -24928,7 +24928,7 @@
             </p:txBody>
           </p:sp>
         </mc:Choice>
-        <mc:Fallback>
+        <mc:Fallback xmlns="">
           <p:sp>
             <p:nvSpPr>
               <p:cNvPr id="10" name="TextBox 9"/>
@@ -24967,8 +24967,8 @@
           </p:sp>
         </mc:Fallback>
       </mc:AlternateContent>
-      <mc:AlternateContent xmlns:mc="http://schemas.openxmlformats.org/markup-compatibility/2006">
-        <mc:Choice xmlns:a14="http://schemas.microsoft.com/office/drawing/2010/main" Requires="a14">
+      <mc:AlternateContent xmlns:mc="http://schemas.openxmlformats.org/markup-compatibility/2006" xmlns:a14="http://schemas.microsoft.com/office/drawing/2010/main">
+        <mc:Choice Requires="a14">
           <p:sp>
             <p:nvSpPr>
               <p:cNvPr id="11" name="TextBox 10"/>
@@ -25145,7 +25145,7 @@
             </p:txBody>
           </p:sp>
         </mc:Choice>
-        <mc:Fallback>
+        <mc:Fallback xmlns="">
           <p:sp>
             <p:nvSpPr>
               <p:cNvPr id="11" name="TextBox 10"/>
@@ -27047,8 +27047,8 @@
           </a:p>
         </p:txBody>
       </p:sp>
-      <mc:AlternateContent xmlns:mc="http://schemas.openxmlformats.org/markup-compatibility/2006">
-        <mc:Choice xmlns:a14="http://schemas.microsoft.com/office/drawing/2010/main" Requires="a14">
+      <mc:AlternateContent xmlns:mc="http://schemas.openxmlformats.org/markup-compatibility/2006" xmlns:a14="http://schemas.microsoft.com/office/drawing/2010/main">
+        <mc:Choice Requires="a14">
           <p:sp>
             <p:nvSpPr>
               <p:cNvPr id="2" name="TextBox 1"/>
@@ -27176,7 +27176,7 @@
             </p:txBody>
           </p:sp>
         </mc:Choice>
-        <mc:Fallback>
+        <mc:Fallback xmlns="">
           <p:sp>
             <p:nvSpPr>
               <p:cNvPr id="2" name="TextBox 1"/>
@@ -27215,8 +27215,8 @@
           </p:sp>
         </mc:Fallback>
       </mc:AlternateContent>
-      <mc:AlternateContent xmlns:mc="http://schemas.openxmlformats.org/markup-compatibility/2006">
-        <mc:Choice xmlns:a14="http://schemas.microsoft.com/office/drawing/2010/main" Requires="a14">
+      <mc:AlternateContent xmlns:mc="http://schemas.openxmlformats.org/markup-compatibility/2006" xmlns:a14="http://schemas.microsoft.com/office/drawing/2010/main">
+        <mc:Choice Requires="a14">
           <p:sp>
             <p:nvSpPr>
               <p:cNvPr id="14" name="TextBox 13"/>
@@ -27362,7 +27362,7 @@
             </p:txBody>
           </p:sp>
         </mc:Choice>
-        <mc:Fallback>
+        <mc:Fallback xmlns="">
           <p:sp>
             <p:nvSpPr>
               <p:cNvPr id="14" name="TextBox 13"/>
@@ -27401,8 +27401,8 @@
           </p:sp>
         </mc:Fallback>
       </mc:AlternateContent>
-      <mc:AlternateContent xmlns:mc="http://schemas.openxmlformats.org/markup-compatibility/2006">
-        <mc:Choice xmlns:a14="http://schemas.microsoft.com/office/drawing/2010/main" Requires="a14">
+      <mc:AlternateContent xmlns:mc="http://schemas.openxmlformats.org/markup-compatibility/2006" xmlns:a14="http://schemas.microsoft.com/office/drawing/2010/main">
+        <mc:Choice Requires="a14">
           <p:sp>
             <p:nvSpPr>
               <p:cNvPr id="15" name="TextBox 14"/>
@@ -27557,7 +27557,7 @@
             </p:txBody>
           </p:sp>
         </mc:Choice>
-        <mc:Fallback>
+        <mc:Fallback xmlns="">
           <p:sp>
             <p:nvSpPr>
               <p:cNvPr id="15" name="TextBox 14"/>
@@ -27596,8 +27596,8 @@
           </p:sp>
         </mc:Fallback>
       </mc:AlternateContent>
-      <mc:AlternateContent xmlns:mc="http://schemas.openxmlformats.org/markup-compatibility/2006">
-        <mc:Choice xmlns:a14="http://schemas.microsoft.com/office/drawing/2010/main" Requires="a14">
+      <mc:AlternateContent xmlns:mc="http://schemas.openxmlformats.org/markup-compatibility/2006" xmlns:a14="http://schemas.microsoft.com/office/drawing/2010/main">
+        <mc:Choice Requires="a14">
           <p:sp>
             <p:nvSpPr>
               <p:cNvPr id="16" name="TextBox 15"/>
@@ -27741,7 +27741,7 @@
             </p:txBody>
           </p:sp>
         </mc:Choice>
-        <mc:Fallback>
+        <mc:Fallback xmlns="">
           <p:sp>
             <p:nvSpPr>
               <p:cNvPr id="16" name="TextBox 15"/>
@@ -27780,8 +27780,8 @@
           </p:sp>
         </mc:Fallback>
       </mc:AlternateContent>
-      <mc:AlternateContent xmlns:mc="http://schemas.openxmlformats.org/markup-compatibility/2006">
-        <mc:Choice xmlns:a14="http://schemas.microsoft.com/office/drawing/2010/main" Requires="a14">
+      <mc:AlternateContent xmlns:mc="http://schemas.openxmlformats.org/markup-compatibility/2006" xmlns:a14="http://schemas.microsoft.com/office/drawing/2010/main">
+        <mc:Choice Requires="a14">
           <p:sp>
             <p:nvSpPr>
               <p:cNvPr id="18" name="TextBox 17"/>
@@ -27943,7 +27943,7 @@
             </p:txBody>
           </p:sp>
         </mc:Choice>
-        <mc:Fallback>
+        <mc:Fallback xmlns="">
           <p:sp>
             <p:nvSpPr>
               <p:cNvPr id="18" name="TextBox 17"/>
@@ -27982,8 +27982,8 @@
           </p:sp>
         </mc:Fallback>
       </mc:AlternateContent>
-      <mc:AlternateContent xmlns:mc="http://schemas.openxmlformats.org/markup-compatibility/2006">
-        <mc:Choice xmlns:a14="http://schemas.microsoft.com/office/drawing/2010/main" Requires="a14">
+      <mc:AlternateContent xmlns:mc="http://schemas.openxmlformats.org/markup-compatibility/2006" xmlns:a14="http://schemas.microsoft.com/office/drawing/2010/main">
+        <mc:Choice Requires="a14">
           <p:sp>
             <p:nvSpPr>
               <p:cNvPr id="19" name="TextBox 18"/>
@@ -28179,7 +28179,7 @@
             </p:txBody>
           </p:sp>
         </mc:Choice>
-        <mc:Fallback>
+        <mc:Fallback xmlns="">
           <p:sp>
             <p:nvSpPr>
               <p:cNvPr id="19" name="TextBox 18"/>
@@ -29348,7 +29348,7 @@
           <a:graphicData uri="http://schemas.openxmlformats.org/presentationml/2006/ole">
             <mc:AlternateContent xmlns:mc="http://schemas.openxmlformats.org/markup-compatibility/2006">
               <mc:Choice xmlns:v="urn:schemas-microsoft-com:vml" Requires="v">
-                <p:oleObj spid="_x0000_s110623" name="Equation" r:id="rId4" imgW="990600" imgH="457200" progId="Equation.DSMT4">
+                <p:oleObj spid="_x0000_s110633" name="Equation" r:id="rId4" imgW="990600" imgH="457200" progId="Equation.DSMT4">
                   <p:embed/>
                 </p:oleObj>
               </mc:Choice>
@@ -29438,7 +29438,7 @@
           <a:graphicData uri="http://schemas.openxmlformats.org/presentationml/2006/ole">
             <mc:AlternateContent xmlns:mc="http://schemas.openxmlformats.org/markup-compatibility/2006">
               <mc:Choice xmlns:v="urn:schemas-microsoft-com:vml" Requires="v">
-                <p:oleObj spid="_x0000_s110624" name="Equation" r:id="rId6" imgW="1256755" imgH="253890" progId="Equation.DSMT4">
+                <p:oleObj spid="_x0000_s110634" name="Equation" r:id="rId6" imgW="1256755" imgH="253890" progId="Equation.DSMT4">
                   <p:embed/>
                 </p:oleObj>
               </mc:Choice>
@@ -29908,7 +29908,7 @@
           <a:graphicData uri="http://schemas.openxmlformats.org/presentationml/2006/ole">
             <mc:AlternateContent xmlns:mc="http://schemas.openxmlformats.org/markup-compatibility/2006">
               <mc:Choice xmlns:v="urn:schemas-microsoft-com:vml" Requires="v">
-                <p:oleObj spid="_x0000_s110625" name="Equation" r:id="rId8" imgW="4241800" imgH="571500" progId="Equation.DSMT4">
+                <p:oleObj spid="_x0000_s110635" name="Equation" r:id="rId8" imgW="4241800" imgH="571500" progId="Equation.DSMT4">
                   <p:embed/>
                 </p:oleObj>
               </mc:Choice>
@@ -30183,7 +30183,7 @@
           <a:graphicData uri="http://schemas.openxmlformats.org/presentationml/2006/ole">
             <mc:AlternateContent xmlns:mc="http://schemas.openxmlformats.org/markup-compatibility/2006">
               <mc:Choice xmlns:v="urn:schemas-microsoft-com:vml" Requires="v">
-                <p:oleObj spid="_x0000_s110626" name="Equation" r:id="rId10" imgW="215900" imgH="241300" progId="Equation.DSMT4">
+                <p:oleObj spid="_x0000_s110636" name="Equation" r:id="rId10" imgW="215900" imgH="241300" progId="Equation.DSMT4">
                   <p:embed/>
                 </p:oleObj>
               </mc:Choice>
@@ -30273,7 +30273,7 @@
           <a:graphicData uri="http://schemas.openxmlformats.org/presentationml/2006/ole">
             <mc:AlternateContent xmlns:mc="http://schemas.openxmlformats.org/markup-compatibility/2006">
               <mc:Choice xmlns:v="urn:schemas-microsoft-com:vml" Requires="v">
-                <p:oleObj spid="_x0000_s110627" name="Equation" r:id="rId12" imgW="203200" imgH="241300" progId="Equation.DSMT4">
+                <p:oleObj spid="_x0000_s110637" name="Equation" r:id="rId12" imgW="203200" imgH="241300" progId="Equation.DSMT4">
                   <p:embed/>
                 </p:oleObj>
               </mc:Choice>
@@ -32938,7 +32938,7 @@
           <a:graphicData uri="http://schemas.openxmlformats.org/presentationml/2006/ole">
             <mc:AlternateContent xmlns:mc="http://schemas.openxmlformats.org/markup-compatibility/2006">
               <mc:Choice xmlns:v="urn:schemas-microsoft-com:vml" Requires="v">
-                <p:oleObj spid="_x0000_s111635" name="Equation" r:id="rId4" imgW="139579" imgH="177646" progId="Equation.3">
+                <p:oleObj spid="_x0000_s111641" name="Equation" r:id="rId4" imgW="139579" imgH="177646" progId="Equation.3">
                   <p:embed/>
                 </p:oleObj>
               </mc:Choice>
@@ -33033,7 +33033,7 @@
           <a:graphicData uri="http://schemas.openxmlformats.org/presentationml/2006/ole">
             <mc:AlternateContent xmlns:mc="http://schemas.openxmlformats.org/markup-compatibility/2006">
               <mc:Choice xmlns:v="urn:schemas-microsoft-com:vml" Requires="v">
-                <p:oleObj spid="_x0000_s111636" name="Equation" r:id="rId6" imgW="1473200" imgH="419100" progId="Equation.DSMT4">
+                <p:oleObj spid="_x0000_s111642" name="Equation" r:id="rId6" imgW="1473200" imgH="419100" progId="Equation.DSMT4">
                   <p:embed/>
                 </p:oleObj>
               </mc:Choice>
@@ -33342,7 +33342,7 @@
           <a:graphicData uri="http://schemas.openxmlformats.org/presentationml/2006/ole">
             <mc:AlternateContent xmlns:mc="http://schemas.openxmlformats.org/markup-compatibility/2006">
               <mc:Choice xmlns:v="urn:schemas-microsoft-com:vml" Requires="v">
-                <p:oleObj spid="_x0000_s111637" name="Equation" r:id="rId8" imgW="914400" imgH="215900" progId="Equation.DSMT4">
+                <p:oleObj spid="_x0000_s111643" name="Equation" r:id="rId8" imgW="914400" imgH="215900" progId="Equation.DSMT4">
                   <p:embed/>
                 </p:oleObj>
               </mc:Choice>
@@ -35976,7 +35976,7 @@
           <a:graphicData uri="http://schemas.openxmlformats.org/presentationml/2006/ole">
             <mc:AlternateContent xmlns:mc="http://schemas.openxmlformats.org/markup-compatibility/2006">
               <mc:Choice xmlns:v="urn:schemas-microsoft-com:vml" Requires="v">
-                <p:oleObj spid="_x0000_s112665" name="Equation" r:id="rId4" imgW="139579" imgH="177646" progId="Equation.3">
+                <p:oleObj spid="_x0000_s112673" name="Equation" r:id="rId4" imgW="139579" imgH="177646" progId="Equation.3">
                   <p:embed/>
                 </p:oleObj>
               </mc:Choice>
@@ -36071,7 +36071,7 @@
           <a:graphicData uri="http://schemas.openxmlformats.org/presentationml/2006/ole">
             <mc:AlternateContent xmlns:mc="http://schemas.openxmlformats.org/markup-compatibility/2006">
               <mc:Choice xmlns:v="urn:schemas-microsoft-com:vml" Requires="v">
-                <p:oleObj spid="_x0000_s112666" name="Equation" r:id="rId6" imgW="3086100" imgH="203200" progId="Equation.DSMT4">
+                <p:oleObj spid="_x0000_s112674" name="Equation" r:id="rId6" imgW="3086100" imgH="203200" progId="Equation.DSMT4">
                   <p:embed/>
                 </p:oleObj>
               </mc:Choice>
@@ -36161,7 +36161,7 @@
           <a:graphicData uri="http://schemas.openxmlformats.org/presentationml/2006/ole">
             <mc:AlternateContent xmlns:mc="http://schemas.openxmlformats.org/markup-compatibility/2006">
               <mc:Choice xmlns:v="urn:schemas-microsoft-com:vml" Requires="v">
-                <p:oleObj spid="_x0000_s112667" name="Equation" r:id="rId8" imgW="3225800" imgH="203200" progId="Equation.3">
+                <p:oleObj spid="_x0000_s112675" name="Equation" r:id="rId8" imgW="3225800" imgH="203200" progId="Equation.3">
                   <p:embed/>
                 </p:oleObj>
               </mc:Choice>
@@ -36251,7 +36251,7 @@
           <a:graphicData uri="http://schemas.openxmlformats.org/presentationml/2006/ole">
             <mc:AlternateContent xmlns:mc="http://schemas.openxmlformats.org/markup-compatibility/2006">
               <mc:Choice xmlns:v="urn:schemas-microsoft-com:vml" Requires="v">
-                <p:oleObj spid="_x0000_s112668" name="Equation" r:id="rId10" imgW="939392" imgH="203112" progId="Equation.DSMT4">
+                <p:oleObj spid="_x0000_s112676" name="Equation" r:id="rId10" imgW="939392" imgH="203112" progId="Equation.DSMT4">
                   <p:embed/>
                 </p:oleObj>
               </mc:Choice>
@@ -37306,7 +37306,7 @@
           <a:graphicData uri="http://schemas.openxmlformats.org/presentationml/2006/ole">
             <mc:AlternateContent xmlns:mc="http://schemas.openxmlformats.org/markup-compatibility/2006">
               <mc:Choice xmlns:v="urn:schemas-microsoft-com:vml" Requires="v">
-                <p:oleObj spid="_x0000_s99362" name="Equation" r:id="rId4" imgW="355292" imgH="393359" progId="Equation.3">
+                <p:oleObj spid="_x0000_s99368" name="Equation" r:id="rId4" imgW="355292" imgH="393359" progId="Equation.3">
                   <p:embed/>
                 </p:oleObj>
               </mc:Choice>
@@ -37402,7 +37402,7 @@
           <a:graphicData uri="http://schemas.openxmlformats.org/presentationml/2006/ole">
             <mc:AlternateContent xmlns:mc="http://schemas.openxmlformats.org/markup-compatibility/2006">
               <mc:Choice xmlns:v="urn:schemas-microsoft-com:vml" Requires="v">
-                <p:oleObj spid="_x0000_s99363" name="Equation" r:id="rId6" imgW="609600" imgH="419100" progId="Equation.3">
+                <p:oleObj spid="_x0000_s99369" name="Equation" r:id="rId6" imgW="609600" imgH="419100" progId="Equation.3">
                   <p:embed/>
                 </p:oleObj>
               </mc:Choice>
@@ -37692,7 +37692,7 @@
           <a:graphicData uri="http://schemas.openxmlformats.org/presentationml/2006/ole">
             <mc:AlternateContent xmlns:mc="http://schemas.openxmlformats.org/markup-compatibility/2006">
               <mc:Choice xmlns:v="urn:schemas-microsoft-com:vml" Requires="v">
-                <p:oleObj spid="_x0000_s99364" name="Equation" r:id="rId8" imgW="1828800" imgH="393700" progId="Equation.DSMT4">
+                <p:oleObj spid="_x0000_s99370" name="Equation" r:id="rId8" imgW="1828800" imgH="393700" progId="Equation.DSMT4">
                   <p:embed/>
                 </p:oleObj>
               </mc:Choice>
@@ -38353,7 +38353,7 @@
 </file>
 
 <file path=ppt/slides/slide4.xml><?xml version="1.0" encoding="utf-8"?>
-<p:sld xmlns:a="http://schemas.openxmlformats.org/drawingml/2006/main" xmlns:r="http://schemas.openxmlformats.org/officeDocument/2006/relationships" xmlns:p="http://schemas.openxmlformats.org/presentationml/2006/main" showMasterPhAnim="0" show="0">
+<p:sld xmlns:a="http://schemas.openxmlformats.org/drawingml/2006/main" xmlns:r="http://schemas.openxmlformats.org/officeDocument/2006/relationships" xmlns:p="http://schemas.openxmlformats.org/presentationml/2006/main" showMasterPhAnim="0">
   <p:cSld>
     <p:spTree>
       <p:nvGrpSpPr>
@@ -38369,17 +38369,83 @@
           <a:chExt cx="0" cy="0"/>
         </a:xfrm>
       </p:grpSpPr>
+      <p:sp>
+        <p:nvSpPr>
+          <p:cNvPr id="2" name="TextBox 1"/>
+          <p:cNvSpPr txBox="1"/>
+          <p:nvPr/>
+        </p:nvSpPr>
+        <p:spPr>
+          <a:xfrm>
+            <a:off x="76200" y="4260794"/>
+            <a:ext cx="4724400" cy="523220"/>
+          </a:xfrm>
+          <a:prstGeom prst="rect">
+            <a:avLst/>
+          </a:prstGeom>
+          <a:noFill/>
+        </p:spPr>
+        <p:txBody>
+          <a:bodyPr wrap="square" rtlCol="0">
+            <a:spAutoFit/>
+          </a:bodyPr>
+          <a:lstStyle/>
+          <a:p>
+            <a:r>
+              <a:rPr lang="en-US" sz="2800" dirty="0">
+                <a:solidFill>
+                  <a:schemeClr val="tx1"/>
+                </a:solidFill>
+              </a:rPr>
+              <a:t>Odds</a:t>
+            </a:r>
+          </a:p>
+        </p:txBody>
+      </p:sp>
+      <p:sp>
+        <p:nvSpPr>
+          <p:cNvPr id="10" name="TextBox 9"/>
+          <p:cNvSpPr txBox="1"/>
+          <p:nvPr/>
+        </p:nvSpPr>
+        <p:spPr>
+          <a:xfrm>
+            <a:off x="0" y="3265197"/>
+            <a:ext cx="4199965" cy="430887"/>
+          </a:xfrm>
+          <a:prstGeom prst="rect">
+            <a:avLst/>
+          </a:prstGeom>
+          <a:noFill/>
+        </p:spPr>
+        <p:txBody>
+          <a:bodyPr wrap="square" rtlCol="0">
+            <a:spAutoFit/>
+          </a:bodyPr>
+          <a:lstStyle/>
+          <a:p>
+            <a:r>
+              <a:rPr lang="en-US" sz="2200" dirty="0">
+                <a:solidFill>
+                  <a:schemeClr val="tx1"/>
+                </a:solidFill>
+              </a:rPr>
+              <a:t>Log(Odds)</a:t>
+            </a:r>
+          </a:p>
+        </p:txBody>
+      </p:sp>
       <mc:AlternateContent xmlns:mc="http://schemas.openxmlformats.org/markup-compatibility/2006" xmlns:a14="http://schemas.microsoft.com/office/drawing/2010/main">
         <mc:Choice Requires="a14">
           <p:sp>
             <p:nvSpPr>
-              <p:cNvPr id="2" name="TextBox 1"/>
+              <p:cNvPr id="11" name="TextBox 10"/>
               <p:cNvSpPr txBox="1"/>
               <p:nvPr/>
             </p:nvSpPr>
             <p:spPr>
               <a:xfrm>
-                <a:off x="76200" y="4260794"/>
+                <a:off x="219635" y="5415798"/>
                 <a:ext cx="4724400" cy="523220"/>
               </a:xfrm>
               <a:prstGeom prst="rect">
@@ -38400,337 +38466,24 @@
                       <m:jc m:val="left"/>
                     </m:oMathParaPr>
                     <m:oMath xmlns:m="http://schemas.openxmlformats.org/officeDocument/2006/math">
-                      <m:sSup>
-                        <m:sSupPr>
-                          <m:ctrlPr>
-                            <a:rPr lang="en-US" sz="2800" b="0" i="1" smtClean="0">
-                              <a:latin typeface="Cambria Math" panose="02040503050406030204" pitchFamily="18" charset="0"/>
-                            </a:rPr>
-                          </m:ctrlPr>
-                        </m:sSupPr>
-                        <m:e>
-                          <m:r>
-                            <m:rPr>
-                              <m:nor/>
-                            </m:rPr>
-                            <a:rPr lang="en-US" sz="2800" dirty="0" smtClean="0"/>
-                            <m:t>Odds</m:t>
-                          </m:r>
-                          <m:r>
-                            <m:rPr>
-                              <m:nor/>
-                            </m:rPr>
-                            <a:rPr lang="en-US" sz="2800" dirty="0" smtClean="0"/>
-                            <m:t> =</m:t>
-                          </m:r>
-                          <m:r>
-                            <a:rPr lang="en-US" sz="2800" b="0" i="1" smtClean="0">
-                              <a:latin typeface="Cambria Math" panose="02040503050406030204" pitchFamily="18" charset="0"/>
-                            </a:rPr>
-                            <m:t>𝑒</m:t>
-                          </m:r>
-                        </m:e>
-                        <m:sup>
-                          <m:r>
-                            <a:rPr lang="en-US" sz="2800" b="0" i="1" smtClean="0">
-                              <a:latin typeface="Cambria Math" panose="02040503050406030204" pitchFamily="18" charset="0"/>
-                            </a:rPr>
-                            <m:t>64.14−0.9424</m:t>
-                          </m:r>
-                          <m:r>
-                            <a:rPr lang="en-US" sz="2800" b="0" i="1" smtClean="0">
-                              <a:latin typeface="Cambria Math" panose="02040503050406030204" pitchFamily="18" charset="0"/>
-                            </a:rPr>
-                            <m:t>𝐻𝑔𝑡</m:t>
-                          </m:r>
-                        </m:sup>
-                      </m:sSup>
+                      <m:r>
+                        <a:rPr lang="en-US" sz="2800" i="1" smtClean="0">
+                          <a:solidFill>
+                            <a:schemeClr val="tx1"/>
+                          </a:solidFill>
+                          <a:latin typeface="Cambria Math" panose="02040503050406030204" pitchFamily="18" charset="0"/>
+                          <a:ea typeface="Cambria Math" panose="02040503050406030204" pitchFamily="18" charset="0"/>
+                        </a:rPr>
+                        <m:t>𝜋</m:t>
+                      </m:r>
                     </m:oMath>
                   </m:oMathPara>
                 </a14:m>
-                <a:endParaRPr lang="en-US" sz="2800" dirty="0"/>
-              </a:p>
-            </p:txBody>
-          </p:sp>
-        </mc:Choice>
-        <mc:Fallback xmlns="">
-          <p:sp>
-            <p:nvSpPr>
-              <p:cNvPr id="2" name="TextBox 1"/>
-              <p:cNvSpPr txBox="1">
-                <a:spLocks noRot="1" noChangeAspect="1" noMove="1" noResize="1" noEditPoints="1" noAdjustHandles="1" noChangeArrowheads="1" noChangeShapeType="1" noTextEdit="1"/>
-              </p:cNvSpPr>
-              <p:nvPr/>
-            </p:nvSpPr>
-            <p:spPr>
-              <a:xfrm>
-                <a:off x="76200" y="4260794"/>
-                <a:ext cx="4724400" cy="523220"/>
-              </a:xfrm>
-              <a:prstGeom prst="rect">
-                <a:avLst/>
-              </a:prstGeom>
-              <a:blipFill>
-                <a:blip r:embed="rId2"/>
-                <a:stretch>
-                  <a:fillRect/>
-                </a:stretch>
-              </a:blipFill>
-            </p:spPr>
-            <p:txBody>
-              <a:bodyPr/>
-              <a:lstStyle/>
-              <a:p>
-                <a:r>
-                  <a:rPr lang="en-US">
-                    <a:noFill/>
-                  </a:rPr>
-                  <a:t> </a:t>
-                </a:r>
-              </a:p>
-            </p:txBody>
-          </p:sp>
-        </mc:Fallback>
-      </mc:AlternateContent>
-      <mc:AlternateContent xmlns:mc="http://schemas.openxmlformats.org/markup-compatibility/2006" xmlns:a14="http://schemas.microsoft.com/office/drawing/2010/main">
-        <mc:Choice Requires="a14">
-          <p:sp>
-            <p:nvSpPr>
-              <p:cNvPr id="10" name="TextBox 9"/>
-              <p:cNvSpPr txBox="1"/>
-              <p:nvPr/>
-            </p:nvSpPr>
-            <p:spPr>
-              <a:xfrm>
-                <a:off x="219635" y="3263562"/>
-                <a:ext cx="4047565" cy="430887"/>
-              </a:xfrm>
-              <a:prstGeom prst="rect">
-                <a:avLst/>
-              </a:prstGeom>
-              <a:noFill/>
-            </p:spPr>
-            <p:txBody>
-              <a:bodyPr wrap="square" rtlCol="0">
-                <a:spAutoFit/>
-              </a:bodyPr>
-              <a:lstStyle/>
-              <a:p>
-                <a:r>
-                  <a:rPr lang="en-US" sz="2200" dirty="0"/>
-                  <a:t>Log(Odds) =</a:t>
-                </a:r>
-                <a:r>
-                  <a:rPr lang="en-US" sz="2200" b="0" dirty="0"/>
-                  <a:t> </a:t>
-                </a:r>
-                <a14:m>
-                  <m:oMath xmlns:m="http://schemas.openxmlformats.org/officeDocument/2006/math">
-                    <m:r>
-                      <a:rPr lang="en-US" sz="2200" b="0" i="1" smtClean="0">
-                        <a:latin typeface="Cambria Math" panose="02040503050406030204" pitchFamily="18" charset="0"/>
-                      </a:rPr>
-                      <m:t>64.14−0.9424</m:t>
-                    </m:r>
-                    <m:r>
-                      <a:rPr lang="en-US" sz="2200" b="0" i="1" smtClean="0">
-                        <a:latin typeface="Cambria Math" panose="02040503050406030204" pitchFamily="18" charset="0"/>
-                      </a:rPr>
-                      <m:t>𝐻𝑔𝑡</m:t>
-                    </m:r>
-                  </m:oMath>
-                </a14:m>
-                <a:endParaRPr lang="en-US" sz="2200" dirty="0"/>
-              </a:p>
-            </p:txBody>
-          </p:sp>
-        </mc:Choice>
-        <mc:Fallback xmlns="">
-          <p:sp>
-            <p:nvSpPr>
-              <p:cNvPr id="10" name="TextBox 9"/>
-              <p:cNvSpPr txBox="1">
-                <a:spLocks noRot="1" noChangeAspect="1" noMove="1" noResize="1" noEditPoints="1" noAdjustHandles="1" noChangeArrowheads="1" noChangeShapeType="1" noTextEdit="1"/>
-              </p:cNvSpPr>
-              <p:nvPr/>
-            </p:nvSpPr>
-            <p:spPr>
-              <a:xfrm>
-                <a:off x="219635" y="3263562"/>
-                <a:ext cx="4047565" cy="430887"/>
-              </a:xfrm>
-              <a:prstGeom prst="rect">
-                <a:avLst/>
-              </a:prstGeom>
-              <a:blipFill>
-                <a:blip r:embed="rId3"/>
-                <a:stretch>
-                  <a:fillRect l="-1958" t="-8451" r="-151" b="-28169"/>
-                </a:stretch>
-              </a:blipFill>
-            </p:spPr>
-            <p:txBody>
-              <a:bodyPr/>
-              <a:lstStyle/>
-              <a:p>
-                <a:r>
-                  <a:rPr lang="en-US">
-                    <a:noFill/>
-                  </a:rPr>
-                  <a:t> </a:t>
-                </a:r>
-              </a:p>
-            </p:txBody>
-          </p:sp>
-        </mc:Fallback>
-      </mc:AlternateContent>
-      <mc:AlternateContent xmlns:mc="http://schemas.openxmlformats.org/markup-compatibility/2006" xmlns:a14="http://schemas.microsoft.com/office/drawing/2010/main">
-        <mc:Choice Requires="a14">
-          <p:sp>
-            <p:nvSpPr>
-              <p:cNvPr id="11" name="TextBox 10"/>
-              <p:cNvSpPr txBox="1"/>
-              <p:nvPr/>
-            </p:nvSpPr>
-            <p:spPr>
-              <a:xfrm>
-                <a:off x="219635" y="5415798"/>
-                <a:ext cx="4724400" cy="964367"/>
-              </a:xfrm>
-              <a:prstGeom prst="rect">
-                <a:avLst/>
-              </a:prstGeom>
-              <a:noFill/>
-            </p:spPr>
-            <p:txBody>
-              <a:bodyPr wrap="square" rtlCol="0">
-                <a:spAutoFit/>
-              </a:bodyPr>
-              <a:lstStyle/>
-              <a:p>
-                <a:pPr/>
-                <a14:m>
-                  <m:oMathPara xmlns:m="http://schemas.openxmlformats.org/officeDocument/2006/math">
-                    <m:oMathParaPr>
-                      <m:jc m:val="left"/>
-                    </m:oMathParaPr>
-                    <m:oMath xmlns:m="http://schemas.openxmlformats.org/officeDocument/2006/math">
-                      <m:acc>
-                        <m:accPr>
-                          <m:chr m:val="̂"/>
-                          <m:ctrlPr>
-                            <a:rPr lang="en-US" sz="2800" i="1" smtClean="0">
-                              <a:latin typeface="Cambria Math" panose="02040503050406030204" pitchFamily="18" charset="0"/>
-                              <a:ea typeface="Cambria Math" panose="02040503050406030204" pitchFamily="18" charset="0"/>
-                            </a:rPr>
-                          </m:ctrlPr>
-                        </m:accPr>
-                        <m:e>
-                          <m:r>
-                            <a:rPr lang="en-US" sz="2800" i="1" smtClean="0">
-                              <a:latin typeface="Cambria Math" panose="02040503050406030204" pitchFamily="18" charset="0"/>
-                              <a:ea typeface="Cambria Math" panose="02040503050406030204" pitchFamily="18" charset="0"/>
-                            </a:rPr>
-                            <m:t>𝜋</m:t>
-                          </m:r>
-                        </m:e>
-                      </m:acc>
-                      <m:r>
-                        <a:rPr lang="en-US" sz="2800" b="0" i="1" smtClean="0">
-                          <a:latin typeface="Cambria Math" panose="02040503050406030204" pitchFamily="18" charset="0"/>
-                          <a:ea typeface="Cambria Math" panose="02040503050406030204" pitchFamily="18" charset="0"/>
-                        </a:rPr>
-                        <m:t>=</m:t>
-                      </m:r>
-                      <m:f>
-                        <m:fPr>
-                          <m:ctrlPr>
-                            <a:rPr lang="en-US" sz="2800" b="0" i="1" smtClean="0">
-                              <a:latin typeface="Cambria Math" panose="02040503050406030204" pitchFamily="18" charset="0"/>
-                              <a:ea typeface="Cambria Math" panose="02040503050406030204" pitchFamily="18" charset="0"/>
-                            </a:rPr>
-                          </m:ctrlPr>
-                        </m:fPr>
-                        <m:num>
-                          <m:sSup>
-                            <m:sSupPr>
-                              <m:ctrlPr>
-                                <a:rPr lang="en-US" sz="2800" b="0" i="1" smtClean="0">
-                                  <a:latin typeface="Cambria Math" panose="02040503050406030204" pitchFamily="18" charset="0"/>
-                                </a:rPr>
-                              </m:ctrlPr>
-                            </m:sSupPr>
-                            <m:e>
-                              <m:r>
-                                <a:rPr lang="en-US" sz="2800" b="0" i="1" smtClean="0">
-                                  <a:latin typeface="Cambria Math" panose="02040503050406030204" pitchFamily="18" charset="0"/>
-                                </a:rPr>
-                                <m:t>𝑒</m:t>
-                              </m:r>
-                            </m:e>
-                            <m:sup>
-                              <m:r>
-                                <a:rPr lang="en-US" sz="2800" b="0" i="1" smtClean="0">
-                                  <a:latin typeface="Cambria Math" panose="02040503050406030204" pitchFamily="18" charset="0"/>
-                                </a:rPr>
-                                <m:t>64.14−0.9424</m:t>
-                              </m:r>
-                              <m:r>
-                                <a:rPr lang="en-US" sz="2800" b="0" i="1" smtClean="0">
-                                  <a:latin typeface="Cambria Math" panose="02040503050406030204" pitchFamily="18" charset="0"/>
-                                </a:rPr>
-                                <m:t>𝐻𝑔𝑡</m:t>
-                              </m:r>
-                            </m:sup>
-                          </m:sSup>
-                        </m:num>
-                        <m:den>
-                          <m:sSup>
-                            <m:sSupPr>
-                              <m:ctrlPr>
-                                <a:rPr lang="en-US" sz="2800" b="0" i="1" smtClean="0">
-                                  <a:latin typeface="Cambria Math" panose="02040503050406030204" pitchFamily="18" charset="0"/>
-                                </a:rPr>
-                              </m:ctrlPr>
-                            </m:sSupPr>
-                            <m:e>
-                              <m:r>
-                                <m:rPr>
-                                  <m:nor/>
-                                </m:rPr>
-                                <a:rPr lang="en-US" sz="2800" b="0" i="0" smtClean="0">
-                                  <a:latin typeface="Cambria Math" panose="02040503050406030204" pitchFamily="18" charset="0"/>
-                                </a:rPr>
-                                <m:t>1+</m:t>
-                              </m:r>
-                              <m:r>
-                                <a:rPr lang="en-US" sz="2800" b="0" i="1" smtClean="0">
-                                  <a:latin typeface="Cambria Math" panose="02040503050406030204" pitchFamily="18" charset="0"/>
-                                </a:rPr>
-                                <m:t>𝑒</m:t>
-                              </m:r>
-                            </m:e>
-                            <m:sup>
-                              <m:r>
-                                <a:rPr lang="en-US" sz="2800" b="0" i="1" smtClean="0">
-                                  <a:latin typeface="Cambria Math" panose="02040503050406030204" pitchFamily="18" charset="0"/>
-                                </a:rPr>
-                                <m:t>64.14−0.9424</m:t>
-                              </m:r>
-                              <m:r>
-                                <a:rPr lang="en-US" sz="2800" b="0" i="1" smtClean="0">
-                                  <a:latin typeface="Cambria Math" panose="02040503050406030204" pitchFamily="18" charset="0"/>
-                                </a:rPr>
-                                <m:t>𝐻𝑔𝑡</m:t>
-                              </m:r>
-                            </m:sup>
-                          </m:sSup>
-                        </m:den>
-                      </m:f>
-                    </m:oMath>
-                  </m:oMathPara>
-                </a14:m>
-                <a:endParaRPr lang="en-US" sz="2800" dirty="0"/>
+                <a:endParaRPr lang="en-US" sz="2800" dirty="0">
+                  <a:solidFill>
+                    <a:schemeClr val="tx1"/>
+                  </a:solidFill>
+                </a:endParaRPr>
               </a:p>
             </p:txBody>
           </p:sp>
@@ -38747,13 +38500,13 @@
             <p:spPr>
               <a:xfrm>
                 <a:off x="219635" y="5415798"/>
-                <a:ext cx="4724400" cy="964367"/>
+                <a:ext cx="4724400" cy="523220"/>
               </a:xfrm>
               <a:prstGeom prst="rect">
                 <a:avLst/>
               </a:prstGeom>
               <a:blipFill>
-                <a:blip r:embed="rId4"/>
+                <a:blip r:embed="rId2"/>
                 <a:stretch>
                   <a:fillRect/>
                 </a:stretch>
@@ -38798,14 +38551,20 @@
           <a:p>
             <a:r>
               <a:rPr lang="en-US" sz="2600" b="1" u="sng" dirty="0">
+                <a:solidFill>
+                  <a:schemeClr val="tx1"/>
+                </a:solidFill>
                 <a:latin typeface="Helvetica" panose="020B0604020202020204" pitchFamily="34" charset="0"/>
                 <a:cs typeface="Helvetica" panose="020B0604020202020204" pitchFamily="34" charset="0"/>
               </a:rPr>
-              <a:t>71.5”		68.5”		61.5”</a:t>
+              <a:t>69”		68”		67”</a:t>
             </a:r>
           </a:p>
           <a:p>
             <a:endParaRPr lang="en-US" sz="2600" dirty="0">
+              <a:solidFill>
+                <a:schemeClr val="tx1"/>
+              </a:solidFill>
               <a:latin typeface="Helvetica" panose="020B0604020202020204" pitchFamily="34" charset="0"/>
               <a:cs typeface="Helvetica" panose="020B0604020202020204" pitchFamily="34" charset="0"/>
             </a:endParaRPr>
@@ -38813,20 +38572,29 @@
           <a:p>
             <a:r>
               <a:rPr lang="en-US" sz="2600" dirty="0">
+                <a:solidFill>
+                  <a:schemeClr val="tx1"/>
+                </a:solidFill>
                 <a:latin typeface="Helvetica" panose="020B0604020202020204" pitchFamily="34" charset="0"/>
                 <a:cs typeface="Helvetica" panose="020B0604020202020204" pitchFamily="34" charset="0"/>
               </a:rPr>
-              <a:t>-3.242	-0.414	6.182</a:t>
+              <a:t>		</a:t>
             </a:r>
           </a:p>
           <a:p>
             <a:endParaRPr lang="en-US" sz="2600" dirty="0">
+              <a:solidFill>
+                <a:schemeClr val="tx1"/>
+              </a:solidFill>
               <a:latin typeface="Helvetica" panose="020B0604020202020204" pitchFamily="34" charset="0"/>
               <a:cs typeface="Helvetica" panose="020B0604020202020204" pitchFamily="34" charset="0"/>
             </a:endParaRPr>
           </a:p>
           <a:p>
             <a:endParaRPr lang="en-US" sz="2600" dirty="0">
+              <a:solidFill>
+                <a:schemeClr val="tx1"/>
+              </a:solidFill>
               <a:latin typeface="Helvetica" panose="020B0604020202020204" pitchFamily="34" charset="0"/>
               <a:cs typeface="Helvetica" panose="020B0604020202020204" pitchFamily="34" charset="0"/>
             </a:endParaRPr>
@@ -38834,20 +38602,29 @@
           <a:p>
             <a:r>
               <a:rPr lang="en-US" sz="2600" dirty="0">
+                <a:solidFill>
+                  <a:schemeClr val="tx1"/>
+                </a:solidFill>
                 <a:latin typeface="Helvetica" panose="020B0604020202020204" pitchFamily="34" charset="0"/>
                 <a:cs typeface="Helvetica" panose="020B0604020202020204" pitchFamily="34" charset="0"/>
               </a:rPr>
-              <a:t>0.039		0.661		484.1</a:t>
+              <a:t>				</a:t>
             </a:r>
           </a:p>
           <a:p>
             <a:endParaRPr lang="en-US" sz="2600" dirty="0">
+              <a:solidFill>
+                <a:schemeClr val="tx1"/>
+              </a:solidFill>
               <a:latin typeface="Helvetica" panose="020B0604020202020204" pitchFamily="34" charset="0"/>
               <a:cs typeface="Helvetica" panose="020B0604020202020204" pitchFamily="34" charset="0"/>
             </a:endParaRPr>
           </a:p>
           <a:p>
             <a:endParaRPr lang="en-US" sz="2600" dirty="0">
+              <a:solidFill>
+                <a:schemeClr val="tx1"/>
+              </a:solidFill>
               <a:latin typeface="Helvetica" panose="020B0604020202020204" pitchFamily="34" charset="0"/>
               <a:cs typeface="Helvetica" panose="020B0604020202020204" pitchFamily="34" charset="0"/>
             </a:endParaRPr>
@@ -38855,10 +38632,13 @@
           <a:p>
             <a:r>
               <a:rPr lang="en-US" sz="2600" dirty="0">
+                <a:solidFill>
+                  <a:schemeClr val="tx1"/>
+                </a:solidFill>
                 <a:latin typeface="Helvetica" panose="020B0604020202020204" pitchFamily="34" charset="0"/>
                 <a:cs typeface="Helvetica" panose="020B0604020202020204" pitchFamily="34" charset="0"/>
               </a:rPr>
-              <a:t>0.038		0.397		0.998</a:t>
+              <a:t>				</a:t>
             </a:r>
           </a:p>
         </p:txBody>
@@ -38872,7 +38652,7 @@
           <p:nvPr/>
         </p:nvPicPr>
         <p:blipFill rotWithShape="1">
-          <a:blip r:embed="rId5"/>
+          <a:blip r:embed="rId3"/>
           <a:srcRect t="49877" b="12122"/>
           <a:stretch/>
         </p:blipFill>
@@ -39098,23 +38878,34 @@
           <a:p>
             <a:pPr algn="ctr"/>
             <a:r>
-              <a:rPr lang="en-US" sz="2400" dirty="0"/>
+              <a:rPr lang="en-US" sz="2400" dirty="0">
+                <a:solidFill>
+                  <a:schemeClr val="bg1"/>
+                </a:solidFill>
+              </a:rPr>
               <a:t>Taller    </a:t>
             </a:r>
             <a:r>
               <a:rPr lang="en-US" sz="2400" dirty="0">
+                <a:solidFill>
+                  <a:schemeClr val="bg1"/>
+                </a:solidFill>
                 <a:sym typeface="Wingdings" panose="05000000000000000000" pitchFamily="2" charset="2"/>
               </a:rPr>
               <a:t>      Shorter</a:t>
             </a:r>
-            <a:endParaRPr lang="en-US" sz="2400" dirty="0"/>
+            <a:endParaRPr lang="en-US" sz="2400" dirty="0">
+              <a:solidFill>
+                <a:schemeClr val="bg1"/>
+              </a:solidFill>
+            </a:endParaRPr>
           </a:p>
         </p:txBody>
       </p:sp>
     </p:spTree>
     <p:extLst>
       <p:ext uri="{BB962C8B-B14F-4D97-AF65-F5344CB8AC3E}">
-        <p14:creationId xmlns:p14="http://schemas.microsoft.com/office/powerpoint/2010/main" val="1221216393"/>
+        <p14:creationId xmlns:p14="http://schemas.microsoft.com/office/powerpoint/2010/main" val="1526971153"/>
       </p:ext>
     </p:extLst>
   </p:cSld>
@@ -39265,84 +39056,17 @@
           <a:chExt cx="0" cy="0"/>
         </a:xfrm>
       </p:grpSpPr>
-      <p:sp>
-        <p:nvSpPr>
-          <p:cNvPr id="2" name="TextBox 1"/>
-          <p:cNvSpPr txBox="1"/>
-          <p:nvPr/>
-        </p:nvSpPr>
-        <p:spPr>
-          <a:xfrm>
-            <a:off x="76200" y="4260794"/>
-            <a:ext cx="4724400" cy="523220"/>
-          </a:xfrm>
-          <a:prstGeom prst="rect">
-            <a:avLst/>
-          </a:prstGeom>
-          <a:noFill/>
-        </p:spPr>
-        <p:txBody>
-          <a:bodyPr wrap="square" rtlCol="0">
-            <a:spAutoFit/>
-          </a:bodyPr>
-          <a:lstStyle/>
-          <a:p>
-            <a:pPr/>
-            <a:r>
-              <a:rPr lang="en-US" sz="2800" dirty="0">
-                <a:solidFill>
-                  <a:schemeClr val="tx1"/>
-                </a:solidFill>
-              </a:rPr>
-              <a:t>Odds</a:t>
-            </a:r>
-          </a:p>
-        </p:txBody>
-      </p:sp>
-      <p:sp>
-        <p:nvSpPr>
-          <p:cNvPr id="10" name="TextBox 9"/>
-          <p:cNvSpPr txBox="1"/>
-          <p:nvPr/>
-        </p:nvSpPr>
-        <p:spPr>
-          <a:xfrm>
-            <a:off x="0" y="3265197"/>
-            <a:ext cx="4199965" cy="430887"/>
-          </a:xfrm>
-          <a:prstGeom prst="rect">
-            <a:avLst/>
-          </a:prstGeom>
-          <a:noFill/>
-        </p:spPr>
-        <p:txBody>
-          <a:bodyPr wrap="square" rtlCol="0">
-            <a:spAutoFit/>
-          </a:bodyPr>
-          <a:lstStyle/>
-          <a:p>
-            <a:r>
-              <a:rPr lang="en-US" sz="2200" dirty="0">
-                <a:solidFill>
-                  <a:schemeClr val="tx1"/>
-                </a:solidFill>
-              </a:rPr>
-              <a:t>Log(Odds)</a:t>
-            </a:r>
-          </a:p>
-        </p:txBody>
-      </p:sp>
       <mc:AlternateContent xmlns:mc="http://schemas.openxmlformats.org/markup-compatibility/2006">
         <mc:Choice xmlns:a14="http://schemas.microsoft.com/office/drawing/2010/main" Requires="a14">
           <p:sp>
             <p:nvSpPr>
-              <p:cNvPr id="11" name="TextBox 10"/>
+              <p:cNvPr id="2" name="TextBox 1"/>
               <p:cNvSpPr txBox="1"/>
               <p:nvPr/>
             </p:nvSpPr>
             <p:spPr>
               <a:xfrm>
-                <a:off x="219635" y="5415798"/>
+                <a:off x="76200" y="4260794"/>
                 <a:ext cx="4724400" cy="523220"/>
               </a:xfrm>
               <a:prstGeom prst="rect">
@@ -39363,22 +39087,420 @@
                       <m:jc m:val="left"/>
                     </m:oMathParaPr>
                     <m:oMath xmlns:m="http://schemas.openxmlformats.org/officeDocument/2006/math">
-                      <m:r>
-                        <a:rPr lang="en-US" sz="2800" i="1" smtClean="0">
-                          <a:solidFill>
-                            <a:schemeClr val="tx1"/>
-                          </a:solidFill>
-                          <a:latin typeface="Cambria Math" panose="02040503050406030204" pitchFamily="18" charset="0"/>
-                          <a:ea typeface="Cambria Math" panose="02040503050406030204" pitchFamily="18" charset="0"/>
-                        </a:rPr>
-                        <m:t>𝜋</m:t>
-                      </m:r>
+                      <m:sSup>
+                        <m:sSupPr>
+                          <m:ctrlPr>
+                            <a:rPr lang="en-US" sz="2800" b="0" i="1" smtClean="0">
+                              <a:solidFill>
+                                <a:schemeClr val="bg1"/>
+                              </a:solidFill>
+                              <a:latin typeface="Cambria Math" panose="02040503050406030204" pitchFamily="18" charset="0"/>
+                            </a:rPr>
+                          </m:ctrlPr>
+                        </m:sSupPr>
+                        <m:e>
+                          <m:r>
+                            <m:rPr>
+                              <m:nor/>
+                            </m:rPr>
+                            <a:rPr lang="en-US" sz="2800" dirty="0" smtClean="0">
+                              <a:solidFill>
+                                <a:schemeClr val="bg1"/>
+                              </a:solidFill>
+                            </a:rPr>
+                            <m:t>Odds</m:t>
+                          </m:r>
+                          <m:r>
+                            <m:rPr>
+                              <m:nor/>
+                            </m:rPr>
+                            <a:rPr lang="en-US" sz="2800" dirty="0" smtClean="0">
+                              <a:solidFill>
+                                <a:schemeClr val="bg1"/>
+                              </a:solidFill>
+                            </a:rPr>
+                            <m:t> =</m:t>
+                          </m:r>
+                          <m:r>
+                            <a:rPr lang="en-US" sz="2800" b="0" i="1" smtClean="0">
+                              <a:solidFill>
+                                <a:schemeClr val="bg1"/>
+                              </a:solidFill>
+                              <a:latin typeface="Cambria Math" panose="02040503050406030204" pitchFamily="18" charset="0"/>
+                            </a:rPr>
+                            <m:t>𝑒</m:t>
+                          </m:r>
+                        </m:e>
+                        <m:sup>
+                          <m:r>
+                            <a:rPr lang="en-US" sz="2800" b="0" i="1" smtClean="0">
+                              <a:solidFill>
+                                <a:schemeClr val="bg1"/>
+                              </a:solidFill>
+                              <a:latin typeface="Cambria Math" panose="02040503050406030204" pitchFamily="18" charset="0"/>
+                            </a:rPr>
+                            <m:t>64.14−0.9424</m:t>
+                          </m:r>
+                          <m:r>
+                            <a:rPr lang="en-US" sz="2800" b="0" i="1" smtClean="0">
+                              <a:solidFill>
+                                <a:schemeClr val="bg1"/>
+                              </a:solidFill>
+                              <a:latin typeface="Cambria Math" panose="02040503050406030204" pitchFamily="18" charset="0"/>
+                            </a:rPr>
+                            <m:t>𝐻𝑔𝑡</m:t>
+                          </m:r>
+                        </m:sup>
+                      </m:sSup>
                     </m:oMath>
                   </m:oMathPara>
                 </a14:m>
                 <a:endParaRPr lang="en-US" sz="2800" dirty="0">
                   <a:solidFill>
-                    <a:schemeClr val="tx1"/>
+                    <a:schemeClr val="bg1"/>
+                  </a:solidFill>
+                </a:endParaRPr>
+              </a:p>
+            </p:txBody>
+          </p:sp>
+        </mc:Choice>
+        <mc:Fallback>
+          <p:sp>
+            <p:nvSpPr>
+              <p:cNvPr id="2" name="TextBox 1"/>
+              <p:cNvSpPr txBox="1">
+                <a:spLocks noRot="1" noChangeAspect="1" noMove="1" noResize="1" noEditPoints="1" noAdjustHandles="1" noChangeArrowheads="1" noChangeShapeType="1" noTextEdit="1"/>
+              </p:cNvSpPr>
+              <p:nvPr/>
+            </p:nvSpPr>
+            <p:spPr>
+              <a:xfrm>
+                <a:off x="76200" y="4260794"/>
+                <a:ext cx="4724400" cy="523220"/>
+              </a:xfrm>
+              <a:prstGeom prst="rect">
+                <a:avLst/>
+              </a:prstGeom>
+              <a:blipFill>
+                <a:blip r:embed="rId2"/>
+                <a:stretch>
+                  <a:fillRect l="-536" b="-20930"/>
+                </a:stretch>
+              </a:blipFill>
+            </p:spPr>
+            <p:txBody>
+              <a:bodyPr/>
+              <a:lstStyle/>
+              <a:p>
+                <a:r>
+                  <a:rPr lang="en-US">
+                    <a:noFill/>
+                  </a:rPr>
+                  <a:t> </a:t>
+                </a:r>
+              </a:p>
+            </p:txBody>
+          </p:sp>
+        </mc:Fallback>
+      </mc:AlternateContent>
+      <mc:AlternateContent xmlns:mc="http://schemas.openxmlformats.org/markup-compatibility/2006">
+        <mc:Choice xmlns:a14="http://schemas.microsoft.com/office/drawing/2010/main" Requires="a14">
+          <p:sp>
+            <p:nvSpPr>
+              <p:cNvPr id="10" name="TextBox 9"/>
+              <p:cNvSpPr txBox="1"/>
+              <p:nvPr/>
+            </p:nvSpPr>
+            <p:spPr>
+              <a:xfrm>
+                <a:off x="219635" y="3263562"/>
+                <a:ext cx="4047565" cy="430887"/>
+              </a:xfrm>
+              <a:prstGeom prst="rect">
+                <a:avLst/>
+              </a:prstGeom>
+              <a:noFill/>
+            </p:spPr>
+            <p:txBody>
+              <a:bodyPr wrap="square" rtlCol="0">
+                <a:spAutoFit/>
+              </a:bodyPr>
+              <a:lstStyle/>
+              <a:p>
+                <a:r>
+                  <a:rPr lang="en-US" sz="2200" dirty="0">
+                    <a:solidFill>
+                      <a:schemeClr val="bg1"/>
+                    </a:solidFill>
+                  </a:rPr>
+                  <a:t>Log(Odds) =</a:t>
+                </a:r>
+                <a:r>
+                  <a:rPr lang="en-US" sz="2200" b="0" dirty="0">
+                    <a:solidFill>
+                      <a:schemeClr val="bg1"/>
+                    </a:solidFill>
+                  </a:rPr>
+                  <a:t> </a:t>
+                </a:r>
+                <a14:m>
+                  <m:oMath xmlns:m="http://schemas.openxmlformats.org/officeDocument/2006/math">
+                    <m:r>
+                      <a:rPr lang="en-US" sz="2200" b="0" i="1" smtClean="0">
+                        <a:solidFill>
+                          <a:schemeClr val="bg1"/>
+                        </a:solidFill>
+                        <a:latin typeface="Cambria Math" panose="02040503050406030204" pitchFamily="18" charset="0"/>
+                      </a:rPr>
+                      <m:t>64.14−0.9424</m:t>
+                    </m:r>
+                    <m:r>
+                      <a:rPr lang="en-US" sz="2200" b="0" i="1" smtClean="0">
+                        <a:solidFill>
+                          <a:schemeClr val="bg1"/>
+                        </a:solidFill>
+                        <a:latin typeface="Cambria Math" panose="02040503050406030204" pitchFamily="18" charset="0"/>
+                      </a:rPr>
+                      <m:t>𝐻𝑔𝑡</m:t>
+                    </m:r>
+                  </m:oMath>
+                </a14:m>
+                <a:endParaRPr lang="en-US" sz="2200" dirty="0">
+                  <a:solidFill>
+                    <a:schemeClr val="bg1"/>
+                  </a:solidFill>
+                </a:endParaRPr>
+              </a:p>
+            </p:txBody>
+          </p:sp>
+        </mc:Choice>
+        <mc:Fallback>
+          <p:sp>
+            <p:nvSpPr>
+              <p:cNvPr id="10" name="TextBox 9"/>
+              <p:cNvSpPr txBox="1">
+                <a:spLocks noRot="1" noChangeAspect="1" noMove="1" noResize="1" noEditPoints="1" noAdjustHandles="1" noChangeArrowheads="1" noChangeShapeType="1" noTextEdit="1"/>
+              </p:cNvSpPr>
+              <p:nvPr/>
+            </p:nvSpPr>
+            <p:spPr>
+              <a:xfrm>
+                <a:off x="219635" y="3263562"/>
+                <a:ext cx="4047565" cy="430887"/>
+              </a:xfrm>
+              <a:prstGeom prst="rect">
+                <a:avLst/>
+              </a:prstGeom>
+              <a:blipFill>
+                <a:blip r:embed="rId3"/>
+                <a:stretch>
+                  <a:fillRect l="-1563" t="-8571" b="-25714"/>
+                </a:stretch>
+              </a:blipFill>
+            </p:spPr>
+            <p:txBody>
+              <a:bodyPr/>
+              <a:lstStyle/>
+              <a:p>
+                <a:r>
+                  <a:rPr lang="en-US">
+                    <a:noFill/>
+                  </a:rPr>
+                  <a:t> </a:t>
+                </a:r>
+              </a:p>
+            </p:txBody>
+          </p:sp>
+        </mc:Fallback>
+      </mc:AlternateContent>
+      <mc:AlternateContent xmlns:mc="http://schemas.openxmlformats.org/markup-compatibility/2006">
+        <mc:Choice xmlns:a14="http://schemas.microsoft.com/office/drawing/2010/main" Requires="a14">
+          <p:sp>
+            <p:nvSpPr>
+              <p:cNvPr id="11" name="TextBox 10"/>
+              <p:cNvSpPr txBox="1"/>
+              <p:nvPr/>
+            </p:nvSpPr>
+            <p:spPr>
+              <a:xfrm>
+                <a:off x="219635" y="5415798"/>
+                <a:ext cx="4724400" cy="964367"/>
+              </a:xfrm>
+              <a:prstGeom prst="rect">
+                <a:avLst/>
+              </a:prstGeom>
+              <a:noFill/>
+            </p:spPr>
+            <p:txBody>
+              <a:bodyPr wrap="square" rtlCol="0">
+                <a:spAutoFit/>
+              </a:bodyPr>
+              <a:lstStyle/>
+              <a:p>
+                <a:pPr/>
+                <a14:m>
+                  <m:oMathPara xmlns:m="http://schemas.openxmlformats.org/officeDocument/2006/math">
+                    <m:oMathParaPr>
+                      <m:jc m:val="left"/>
+                    </m:oMathParaPr>
+                    <m:oMath xmlns:m="http://schemas.openxmlformats.org/officeDocument/2006/math">
+                      <m:acc>
+                        <m:accPr>
+                          <m:chr m:val="̂"/>
+                          <m:ctrlPr>
+                            <a:rPr lang="en-US" sz="2800" i="1" smtClean="0">
+                              <a:solidFill>
+                                <a:schemeClr val="bg1"/>
+                              </a:solidFill>
+                              <a:latin typeface="Cambria Math" panose="02040503050406030204" pitchFamily="18" charset="0"/>
+                              <a:ea typeface="Cambria Math" panose="02040503050406030204" pitchFamily="18" charset="0"/>
+                            </a:rPr>
+                          </m:ctrlPr>
+                        </m:accPr>
+                        <m:e>
+                          <m:r>
+                            <a:rPr lang="en-US" sz="2800" i="1" smtClean="0">
+                              <a:solidFill>
+                                <a:schemeClr val="bg1"/>
+                              </a:solidFill>
+                              <a:latin typeface="Cambria Math" panose="02040503050406030204" pitchFamily="18" charset="0"/>
+                              <a:ea typeface="Cambria Math" panose="02040503050406030204" pitchFamily="18" charset="0"/>
+                            </a:rPr>
+                            <m:t>𝜋</m:t>
+                          </m:r>
+                        </m:e>
+                      </m:acc>
+                      <m:r>
+                        <a:rPr lang="en-US" sz="2800" b="0" i="1" smtClean="0">
+                          <a:solidFill>
+                            <a:schemeClr val="bg1"/>
+                          </a:solidFill>
+                          <a:latin typeface="Cambria Math" panose="02040503050406030204" pitchFamily="18" charset="0"/>
+                          <a:ea typeface="Cambria Math" panose="02040503050406030204" pitchFamily="18" charset="0"/>
+                        </a:rPr>
+                        <m:t>=</m:t>
+                      </m:r>
+                      <m:f>
+                        <m:fPr>
+                          <m:ctrlPr>
+                            <a:rPr lang="en-US" sz="2800" b="0" i="1" smtClean="0">
+                              <a:solidFill>
+                                <a:schemeClr val="bg1"/>
+                              </a:solidFill>
+                              <a:latin typeface="Cambria Math" panose="02040503050406030204" pitchFamily="18" charset="0"/>
+                              <a:ea typeface="Cambria Math" panose="02040503050406030204" pitchFamily="18" charset="0"/>
+                            </a:rPr>
+                          </m:ctrlPr>
+                        </m:fPr>
+                        <m:num>
+                          <m:sSup>
+                            <m:sSupPr>
+                              <m:ctrlPr>
+                                <a:rPr lang="en-US" sz="2800" b="0" i="1" smtClean="0">
+                                  <a:solidFill>
+                                    <a:schemeClr val="bg1"/>
+                                  </a:solidFill>
+                                  <a:latin typeface="Cambria Math" panose="02040503050406030204" pitchFamily="18" charset="0"/>
+                                </a:rPr>
+                              </m:ctrlPr>
+                            </m:sSupPr>
+                            <m:e>
+                              <m:r>
+                                <a:rPr lang="en-US" sz="2800" b="0" i="1" smtClean="0">
+                                  <a:solidFill>
+                                    <a:schemeClr val="bg1"/>
+                                  </a:solidFill>
+                                  <a:latin typeface="Cambria Math" panose="02040503050406030204" pitchFamily="18" charset="0"/>
+                                </a:rPr>
+                                <m:t>𝑒</m:t>
+                              </m:r>
+                            </m:e>
+                            <m:sup>
+                              <m:r>
+                                <a:rPr lang="en-US" sz="2800" b="0" i="1" smtClean="0">
+                                  <a:solidFill>
+                                    <a:schemeClr val="bg1"/>
+                                  </a:solidFill>
+                                  <a:latin typeface="Cambria Math" panose="02040503050406030204" pitchFamily="18" charset="0"/>
+                                </a:rPr>
+                                <m:t>64.14−0.9424</m:t>
+                              </m:r>
+                              <m:r>
+                                <a:rPr lang="en-US" sz="2800" b="0" i="1" smtClean="0">
+                                  <a:solidFill>
+                                    <a:schemeClr val="bg1"/>
+                                  </a:solidFill>
+                                  <a:latin typeface="Cambria Math" panose="02040503050406030204" pitchFamily="18" charset="0"/>
+                                </a:rPr>
+                                <m:t>𝐻𝑔𝑡</m:t>
+                              </m:r>
+                            </m:sup>
+                          </m:sSup>
+                        </m:num>
+                        <m:den>
+                          <m:sSup>
+                            <m:sSupPr>
+                              <m:ctrlPr>
+                                <a:rPr lang="en-US" sz="2800" b="0" i="1" smtClean="0">
+                                  <a:solidFill>
+                                    <a:schemeClr val="bg1"/>
+                                  </a:solidFill>
+                                  <a:latin typeface="Cambria Math" panose="02040503050406030204" pitchFamily="18" charset="0"/>
+                                </a:rPr>
+                              </m:ctrlPr>
+                            </m:sSupPr>
+                            <m:e>
+                              <m:r>
+                                <m:rPr>
+                                  <m:nor/>
+                                </m:rPr>
+                                <a:rPr lang="en-US" sz="2800" b="0" i="0" smtClean="0">
+                                  <a:solidFill>
+                                    <a:schemeClr val="bg1"/>
+                                  </a:solidFill>
+                                  <a:latin typeface="Cambria Math" panose="02040503050406030204" pitchFamily="18" charset="0"/>
+                                </a:rPr>
+                                <m:t>1+</m:t>
+                              </m:r>
+                              <m:r>
+                                <a:rPr lang="en-US" sz="2800" b="0" i="1" smtClean="0">
+                                  <a:solidFill>
+                                    <a:schemeClr val="bg1"/>
+                                  </a:solidFill>
+                                  <a:latin typeface="Cambria Math" panose="02040503050406030204" pitchFamily="18" charset="0"/>
+                                </a:rPr>
+                                <m:t>𝑒</m:t>
+                              </m:r>
+                            </m:e>
+                            <m:sup>
+                              <m:r>
+                                <a:rPr lang="en-US" sz="2800" b="0" i="1" smtClean="0">
+                                  <a:solidFill>
+                                    <a:schemeClr val="bg1"/>
+                                  </a:solidFill>
+                                  <a:latin typeface="Cambria Math" panose="02040503050406030204" pitchFamily="18" charset="0"/>
+                                </a:rPr>
+                                <m:t>64.14−0.9424</m:t>
+                              </m:r>
+                              <m:r>
+                                <a:rPr lang="en-US" sz="2800" b="0" i="1" smtClean="0">
+                                  <a:solidFill>
+                                    <a:schemeClr val="bg1"/>
+                                  </a:solidFill>
+                                  <a:latin typeface="Cambria Math" panose="02040503050406030204" pitchFamily="18" charset="0"/>
+                                </a:rPr>
+                                <m:t>𝐻𝑔𝑡</m:t>
+                              </m:r>
+                            </m:sup>
+                          </m:sSup>
+                        </m:den>
+                      </m:f>
+                    </m:oMath>
+                  </m:oMathPara>
+                </a14:m>
+                <a:endParaRPr lang="en-US" sz="2800" dirty="0">
+                  <a:solidFill>
+                    <a:schemeClr val="bg1"/>
                   </a:solidFill>
                 </a:endParaRPr>
               </a:p>
@@ -39397,15 +39519,15 @@
             <p:spPr>
               <a:xfrm>
                 <a:off x="219635" y="5415798"/>
-                <a:ext cx="4724400" cy="523220"/>
+                <a:ext cx="4724400" cy="964367"/>
               </a:xfrm>
               <a:prstGeom prst="rect">
                 <a:avLst/>
               </a:prstGeom>
               <a:blipFill>
-                <a:blip r:embed="rId2"/>
+                <a:blip r:embed="rId4"/>
                 <a:stretch>
-                  <a:fillRect/>
+                  <a:fillRect b="-6494"/>
                 </a:stretch>
               </a:blipFill>
             </p:spPr>
@@ -39424,122 +39546,6 @@
           </p:sp>
         </mc:Fallback>
       </mc:AlternateContent>
-      <p:sp>
-        <p:nvSpPr>
-          <p:cNvPr id="3" name="TextBox 2"/>
-          <p:cNvSpPr txBox="1"/>
-          <p:nvPr/>
-        </p:nvSpPr>
-        <p:spPr>
-          <a:xfrm>
-            <a:off x="4419600" y="2414134"/>
-            <a:ext cx="4724400" cy="3693319"/>
-          </a:xfrm>
-          <a:prstGeom prst="rect">
-            <a:avLst/>
-          </a:prstGeom>
-          <a:noFill/>
-        </p:spPr>
-        <p:txBody>
-          <a:bodyPr wrap="square" rtlCol="0">
-            <a:spAutoFit/>
-          </a:bodyPr>
-          <a:lstStyle/>
-          <a:p>
-            <a:r>
-              <a:rPr lang="en-US" sz="2600" b="1" u="sng" dirty="0">
-                <a:solidFill>
-                  <a:schemeClr val="tx1"/>
-                </a:solidFill>
-                <a:latin typeface="Helvetica" panose="020B0604020202020204" pitchFamily="34" charset="0"/>
-                <a:cs typeface="Helvetica" panose="020B0604020202020204" pitchFamily="34" charset="0"/>
-              </a:rPr>
-              <a:t>69”		68”		67”</a:t>
-            </a:r>
-          </a:p>
-          <a:p>
-            <a:endParaRPr lang="en-US" sz="2600" dirty="0">
-              <a:solidFill>
-                <a:schemeClr val="tx1"/>
-              </a:solidFill>
-              <a:latin typeface="Helvetica" panose="020B0604020202020204" pitchFamily="34" charset="0"/>
-              <a:cs typeface="Helvetica" panose="020B0604020202020204" pitchFamily="34" charset="0"/>
-            </a:endParaRPr>
-          </a:p>
-          <a:p>
-            <a:r>
-              <a:rPr lang="en-US" sz="2600" dirty="0">
-                <a:solidFill>
-                  <a:schemeClr val="tx1"/>
-                </a:solidFill>
-                <a:latin typeface="Helvetica" panose="020B0604020202020204" pitchFamily="34" charset="0"/>
-                <a:cs typeface="Helvetica" panose="020B0604020202020204" pitchFamily="34" charset="0"/>
-              </a:rPr>
-              <a:t>		</a:t>
-            </a:r>
-          </a:p>
-          <a:p>
-            <a:endParaRPr lang="en-US" sz="2600" dirty="0">
-              <a:solidFill>
-                <a:schemeClr val="tx1"/>
-              </a:solidFill>
-              <a:latin typeface="Helvetica" panose="020B0604020202020204" pitchFamily="34" charset="0"/>
-              <a:cs typeface="Helvetica" panose="020B0604020202020204" pitchFamily="34" charset="0"/>
-            </a:endParaRPr>
-          </a:p>
-          <a:p>
-            <a:endParaRPr lang="en-US" sz="2600" dirty="0">
-              <a:solidFill>
-                <a:schemeClr val="tx1"/>
-              </a:solidFill>
-              <a:latin typeface="Helvetica" panose="020B0604020202020204" pitchFamily="34" charset="0"/>
-              <a:cs typeface="Helvetica" panose="020B0604020202020204" pitchFamily="34" charset="0"/>
-            </a:endParaRPr>
-          </a:p>
-          <a:p>
-            <a:r>
-              <a:rPr lang="en-US" sz="2600" dirty="0">
-                <a:solidFill>
-                  <a:schemeClr val="tx1"/>
-                </a:solidFill>
-                <a:latin typeface="Helvetica" panose="020B0604020202020204" pitchFamily="34" charset="0"/>
-                <a:cs typeface="Helvetica" panose="020B0604020202020204" pitchFamily="34" charset="0"/>
-              </a:rPr>
-              <a:t>				</a:t>
-            </a:r>
-          </a:p>
-          <a:p>
-            <a:endParaRPr lang="en-US" sz="2600" dirty="0">
-              <a:solidFill>
-                <a:schemeClr val="tx1"/>
-              </a:solidFill>
-              <a:latin typeface="Helvetica" panose="020B0604020202020204" pitchFamily="34" charset="0"/>
-              <a:cs typeface="Helvetica" panose="020B0604020202020204" pitchFamily="34" charset="0"/>
-            </a:endParaRPr>
-          </a:p>
-          <a:p>
-            <a:endParaRPr lang="en-US" sz="2600" dirty="0">
-              <a:solidFill>
-                <a:schemeClr val="tx1"/>
-              </a:solidFill>
-              <a:latin typeface="Helvetica" panose="020B0604020202020204" pitchFamily="34" charset="0"/>
-              <a:cs typeface="Helvetica" panose="020B0604020202020204" pitchFamily="34" charset="0"/>
-            </a:endParaRPr>
-          </a:p>
-          <a:p>
-            <a:r>
-              <a:rPr lang="en-US" sz="2600" dirty="0">
-                <a:solidFill>
-                  <a:schemeClr val="tx1"/>
-                </a:solidFill>
-                <a:latin typeface="Helvetica" panose="020B0604020202020204" pitchFamily="34" charset="0"/>
-                <a:cs typeface="Helvetica" panose="020B0604020202020204" pitchFamily="34" charset="0"/>
-              </a:rPr>
-              <a:t>				</a:t>
-            </a:r>
-          </a:p>
-        </p:txBody>
-      </p:sp>
       <p:pic>
         <p:nvPicPr>
           <p:cNvPr id="13" name="Picture 12"/>
@@ -39549,7 +39555,7 @@
           <p:nvPr/>
         </p:nvPicPr>
         <p:blipFill rotWithShape="1">
-          <a:blip r:embed="rId3"/>
+          <a:blip r:embed="rId5"/>
           <a:srcRect t="49877" b="12122"/>
           <a:stretch/>
         </p:blipFill>
@@ -39799,10 +39805,789 @@
           </a:p>
         </p:txBody>
       </p:sp>
+      <p:graphicFrame>
+        <p:nvGraphicFramePr>
+          <p:cNvPr id="5" name="Table 4">
+            <a:extLst>
+              <a:ext uri="{FF2B5EF4-FFF2-40B4-BE49-F238E27FC236}">
+                <a16:creationId xmlns:a16="http://schemas.microsoft.com/office/drawing/2014/main" id="{8ADAFD72-CED7-FC49-8148-A37DC12E8BB3}"/>
+              </a:ext>
+            </a:extLst>
+          </p:cNvPr>
+          <p:cNvGraphicFramePr>
+            <a:graphicFrameLocks noGrp="1"/>
+          </p:cNvGraphicFramePr>
+          <p:nvPr>
+            <p:extLst>
+              <p:ext uri="{D42A27DB-BD31-4B8C-83A1-F6EECF244321}">
+                <p14:modId xmlns:p14="http://schemas.microsoft.com/office/powerpoint/2010/main" val="1829669062"/>
+              </p:ext>
+            </p:extLst>
+          </p:nvPr>
+        </p:nvGraphicFramePr>
+        <p:xfrm>
+          <a:off x="4392705" y="2453622"/>
+          <a:ext cx="4675095" cy="3794777"/>
+        </p:xfrm>
+        <a:graphic>
+          <a:graphicData uri="http://schemas.openxmlformats.org/drawingml/2006/table">
+            <a:tbl>
+              <a:tblPr/>
+              <a:tblGrid>
+                <a:gridCol w="1558365">
+                  <a:extLst>
+                    <a:ext uri="{9D8B030D-6E8A-4147-A177-3AD203B41FA5}">
+                      <a16:colId xmlns:a16="http://schemas.microsoft.com/office/drawing/2014/main" val="2077618430"/>
+                    </a:ext>
+                  </a:extLst>
+                </a:gridCol>
+                <a:gridCol w="1558365">
+                  <a:extLst>
+                    <a:ext uri="{9D8B030D-6E8A-4147-A177-3AD203B41FA5}">
+                      <a16:colId xmlns:a16="http://schemas.microsoft.com/office/drawing/2014/main" val="3583580617"/>
+                    </a:ext>
+                  </a:extLst>
+                </a:gridCol>
+                <a:gridCol w="1558365">
+                  <a:extLst>
+                    <a:ext uri="{9D8B030D-6E8A-4147-A177-3AD203B41FA5}">
+                      <a16:colId xmlns:a16="http://schemas.microsoft.com/office/drawing/2014/main" val="684808955"/>
+                    </a:ext>
+                  </a:extLst>
+                </a:gridCol>
+              </a:tblGrid>
+              <a:tr h="777929">
+                <a:tc>
+                  <a:txBody>
+                    <a:bodyPr/>
+                    <a:lstStyle/>
+                    <a:p>
+                      <a:pPr algn="r" rtl="0" fontAlgn="b"/>
+                      <a:r>
+                        <a:rPr lang="en-US" sz="2200" b="1" dirty="0">
+                          <a:solidFill>
+                            <a:schemeClr val="bg1"/>
+                          </a:solidFill>
+                          <a:effectLst/>
+                          <a:latin typeface="Arial" panose="020B0604020202020204" pitchFamily="34" charset="0"/>
+                          <a:cs typeface="Arial" panose="020B0604020202020204" pitchFamily="34" charset="0"/>
+                        </a:rPr>
+                        <a:t>69</a:t>
+                      </a:r>
+                    </a:p>
+                  </a:txBody>
+                  <a:tcPr marL="28575" marR="28575" marT="19050" marB="19050" anchor="b">
+                    <a:lnL w="9525" cap="flat" cmpd="sng" algn="ctr">
+                      <a:solidFill>
+                        <a:srgbClr val="CCCCCC"/>
+                      </a:solidFill>
+                      <a:prstDash val="solid"/>
+                      <a:round/>
+                      <a:headEnd type="none" w="med" len="med"/>
+                      <a:tailEnd type="none" w="med" len="med"/>
+                    </a:lnL>
+                    <a:lnR w="9525" cap="flat" cmpd="sng" algn="ctr">
+                      <a:solidFill>
+                        <a:srgbClr val="CCCCCC"/>
+                      </a:solidFill>
+                      <a:prstDash val="solid"/>
+                      <a:round/>
+                      <a:headEnd type="none" w="med" len="med"/>
+                      <a:tailEnd type="none" w="med" len="med"/>
+                    </a:lnR>
+                    <a:lnT w="9525" cap="flat" cmpd="sng" algn="ctr">
+                      <a:solidFill>
+                        <a:srgbClr val="CCCCCC"/>
+                      </a:solidFill>
+                      <a:prstDash val="solid"/>
+                      <a:round/>
+                      <a:headEnd type="none" w="med" len="med"/>
+                      <a:tailEnd type="none" w="med" len="med"/>
+                    </a:lnT>
+                    <a:lnB w="9525" cap="flat" cmpd="sng" algn="ctr">
+                      <a:solidFill>
+                        <a:srgbClr val="CCCCCC"/>
+                      </a:solidFill>
+                      <a:prstDash val="solid"/>
+                      <a:round/>
+                      <a:headEnd type="none" w="med" len="med"/>
+                      <a:tailEnd type="none" w="med" len="med"/>
+                    </a:lnB>
+                  </a:tcPr>
+                </a:tc>
+                <a:tc>
+                  <a:txBody>
+                    <a:bodyPr/>
+                    <a:lstStyle/>
+                    <a:p>
+                      <a:pPr algn="r" rtl="0" fontAlgn="b"/>
+                      <a:r>
+                        <a:rPr lang="en-US" sz="2200" b="1" dirty="0">
+                          <a:solidFill>
+                            <a:schemeClr val="bg1"/>
+                          </a:solidFill>
+                          <a:effectLst/>
+                          <a:latin typeface="Arial" panose="020B0604020202020204" pitchFamily="34" charset="0"/>
+                          <a:cs typeface="Arial" panose="020B0604020202020204" pitchFamily="34" charset="0"/>
+                        </a:rPr>
+                        <a:t>68</a:t>
+                      </a:r>
+                    </a:p>
+                  </a:txBody>
+                  <a:tcPr marL="28575" marR="28575" marT="19050" marB="19050" anchor="b">
+                    <a:lnL w="9525" cap="flat" cmpd="sng" algn="ctr">
+                      <a:solidFill>
+                        <a:srgbClr val="CCCCCC"/>
+                      </a:solidFill>
+                      <a:prstDash val="solid"/>
+                      <a:round/>
+                      <a:headEnd type="none" w="med" len="med"/>
+                      <a:tailEnd type="none" w="med" len="med"/>
+                    </a:lnL>
+                    <a:lnR w="9525" cap="flat" cmpd="sng" algn="ctr">
+                      <a:solidFill>
+                        <a:srgbClr val="CCCCCC"/>
+                      </a:solidFill>
+                      <a:prstDash val="solid"/>
+                      <a:round/>
+                      <a:headEnd type="none" w="med" len="med"/>
+                      <a:tailEnd type="none" w="med" len="med"/>
+                    </a:lnR>
+                    <a:lnT w="9525" cap="flat" cmpd="sng" algn="ctr">
+                      <a:solidFill>
+                        <a:srgbClr val="CCCCCC"/>
+                      </a:solidFill>
+                      <a:prstDash val="solid"/>
+                      <a:round/>
+                      <a:headEnd type="none" w="med" len="med"/>
+                      <a:tailEnd type="none" w="med" len="med"/>
+                    </a:lnT>
+                    <a:lnB w="9525" cap="flat" cmpd="sng" algn="ctr">
+                      <a:solidFill>
+                        <a:srgbClr val="CCCCCC"/>
+                      </a:solidFill>
+                      <a:prstDash val="solid"/>
+                      <a:round/>
+                      <a:headEnd type="none" w="med" len="med"/>
+                      <a:tailEnd type="none" w="med" len="med"/>
+                    </a:lnB>
+                  </a:tcPr>
+                </a:tc>
+                <a:tc>
+                  <a:txBody>
+                    <a:bodyPr/>
+                    <a:lstStyle/>
+                    <a:p>
+                      <a:pPr algn="r" rtl="0" fontAlgn="b"/>
+                      <a:r>
+                        <a:rPr lang="en-US" sz="2200" b="1" dirty="0">
+                          <a:solidFill>
+                            <a:schemeClr val="bg1"/>
+                          </a:solidFill>
+                          <a:effectLst/>
+                          <a:latin typeface="Arial" panose="020B0604020202020204" pitchFamily="34" charset="0"/>
+                          <a:cs typeface="Arial" panose="020B0604020202020204" pitchFamily="34" charset="0"/>
+                        </a:rPr>
+                        <a:t>67</a:t>
+                      </a:r>
+                    </a:p>
+                  </a:txBody>
+                  <a:tcPr marL="28575" marR="28575" marT="19050" marB="19050" anchor="b">
+                    <a:lnL w="9525" cap="flat" cmpd="sng" algn="ctr">
+                      <a:solidFill>
+                        <a:srgbClr val="CCCCCC"/>
+                      </a:solidFill>
+                      <a:prstDash val="solid"/>
+                      <a:round/>
+                      <a:headEnd type="none" w="med" len="med"/>
+                      <a:tailEnd type="none" w="med" len="med"/>
+                    </a:lnL>
+                    <a:lnR w="9525" cap="flat" cmpd="sng" algn="ctr">
+                      <a:solidFill>
+                        <a:srgbClr val="CCCCCC"/>
+                      </a:solidFill>
+                      <a:prstDash val="solid"/>
+                      <a:round/>
+                      <a:headEnd type="none" w="med" len="med"/>
+                      <a:tailEnd type="none" w="med" len="med"/>
+                    </a:lnR>
+                    <a:lnT w="9525" cap="flat" cmpd="sng" algn="ctr">
+                      <a:solidFill>
+                        <a:srgbClr val="CCCCCC"/>
+                      </a:solidFill>
+                      <a:prstDash val="solid"/>
+                      <a:round/>
+                      <a:headEnd type="none" w="med" len="med"/>
+                      <a:tailEnd type="none" w="med" len="med"/>
+                    </a:lnT>
+                    <a:lnB w="9525" cap="flat" cmpd="sng" algn="ctr">
+                      <a:solidFill>
+                        <a:srgbClr val="CCCCCC"/>
+                      </a:solidFill>
+                      <a:prstDash val="solid"/>
+                      <a:round/>
+                      <a:headEnd type="none" w="med" len="med"/>
+                      <a:tailEnd type="none" w="med" len="med"/>
+                    </a:lnB>
+                  </a:tcPr>
+                </a:tc>
+                <a:extLst>
+                  <a:ext uri="{0D108BD9-81ED-4DB2-BD59-A6C34878D82A}">
+                    <a16:rowId xmlns:a16="http://schemas.microsoft.com/office/drawing/2014/main" val="1983955369"/>
+                  </a:ext>
+                </a:extLst>
+              </a:tr>
+              <a:tr h="777929">
+                <a:tc>
+                  <a:txBody>
+                    <a:bodyPr/>
+                    <a:lstStyle/>
+                    <a:p>
+                      <a:pPr algn="r" rtl="0" fontAlgn="b"/>
+                      <a:r>
+                        <a:rPr lang="en-US" sz="2200">
+                          <a:solidFill>
+                            <a:schemeClr val="bg1"/>
+                          </a:solidFill>
+                          <a:effectLst/>
+                          <a:latin typeface="Arial" panose="020B0604020202020204" pitchFamily="34" charset="0"/>
+                          <a:cs typeface="Arial" panose="020B0604020202020204" pitchFamily="34" charset="0"/>
+                        </a:rPr>
+                        <a:t>-0.880</a:t>
+                      </a:r>
+                    </a:p>
+                  </a:txBody>
+                  <a:tcPr marL="28575" marR="28575" marT="19050" marB="19050" anchor="b">
+                    <a:lnL w="9525" cap="flat" cmpd="sng" algn="ctr">
+                      <a:solidFill>
+                        <a:srgbClr val="CCCCCC"/>
+                      </a:solidFill>
+                      <a:prstDash val="solid"/>
+                      <a:round/>
+                      <a:headEnd type="none" w="med" len="med"/>
+                      <a:tailEnd type="none" w="med" len="med"/>
+                    </a:lnL>
+                    <a:lnR w="9525" cap="flat" cmpd="sng" algn="ctr">
+                      <a:solidFill>
+                        <a:srgbClr val="CCCCCC"/>
+                      </a:solidFill>
+                      <a:prstDash val="solid"/>
+                      <a:round/>
+                      <a:headEnd type="none" w="med" len="med"/>
+                      <a:tailEnd type="none" w="med" len="med"/>
+                    </a:lnR>
+                    <a:lnT w="9525" cap="flat" cmpd="sng" algn="ctr">
+                      <a:solidFill>
+                        <a:srgbClr val="CCCCCC"/>
+                      </a:solidFill>
+                      <a:prstDash val="solid"/>
+                      <a:round/>
+                      <a:headEnd type="none" w="med" len="med"/>
+                      <a:tailEnd type="none" w="med" len="med"/>
+                    </a:lnT>
+                    <a:lnB w="9525" cap="flat" cmpd="sng" algn="ctr">
+                      <a:solidFill>
+                        <a:srgbClr val="CCCCCC"/>
+                      </a:solidFill>
+                      <a:prstDash val="solid"/>
+                      <a:round/>
+                      <a:headEnd type="none" w="med" len="med"/>
+                      <a:tailEnd type="none" w="med" len="med"/>
+                    </a:lnB>
+                  </a:tcPr>
+                </a:tc>
+                <a:tc>
+                  <a:txBody>
+                    <a:bodyPr/>
+                    <a:lstStyle/>
+                    <a:p>
+                      <a:pPr algn="r" rtl="0" fontAlgn="b"/>
+                      <a:r>
+                        <a:rPr lang="en-US" sz="2200">
+                          <a:solidFill>
+                            <a:schemeClr val="bg1"/>
+                          </a:solidFill>
+                          <a:effectLst/>
+                          <a:latin typeface="Arial" panose="020B0604020202020204" pitchFamily="34" charset="0"/>
+                          <a:cs typeface="Arial" panose="020B0604020202020204" pitchFamily="34" charset="0"/>
+                        </a:rPr>
+                        <a:t>0.063</a:t>
+                      </a:r>
+                    </a:p>
+                  </a:txBody>
+                  <a:tcPr marL="28575" marR="28575" marT="19050" marB="19050" anchor="b">
+                    <a:lnL w="9525" cap="flat" cmpd="sng" algn="ctr">
+                      <a:solidFill>
+                        <a:srgbClr val="CCCCCC"/>
+                      </a:solidFill>
+                      <a:prstDash val="solid"/>
+                      <a:round/>
+                      <a:headEnd type="none" w="med" len="med"/>
+                      <a:tailEnd type="none" w="med" len="med"/>
+                    </a:lnL>
+                    <a:lnR w="9525" cap="flat" cmpd="sng" algn="ctr">
+                      <a:solidFill>
+                        <a:srgbClr val="CCCCCC"/>
+                      </a:solidFill>
+                      <a:prstDash val="solid"/>
+                      <a:round/>
+                      <a:headEnd type="none" w="med" len="med"/>
+                      <a:tailEnd type="none" w="med" len="med"/>
+                    </a:lnR>
+                    <a:lnT w="9525" cap="flat" cmpd="sng" algn="ctr">
+                      <a:solidFill>
+                        <a:srgbClr val="CCCCCC"/>
+                      </a:solidFill>
+                      <a:prstDash val="solid"/>
+                      <a:round/>
+                      <a:headEnd type="none" w="med" len="med"/>
+                      <a:tailEnd type="none" w="med" len="med"/>
+                    </a:lnT>
+                    <a:lnB w="9525" cap="flat" cmpd="sng" algn="ctr">
+                      <a:solidFill>
+                        <a:srgbClr val="CCCCCC"/>
+                      </a:solidFill>
+                      <a:prstDash val="solid"/>
+                      <a:round/>
+                      <a:headEnd type="none" w="med" len="med"/>
+                      <a:tailEnd type="none" w="med" len="med"/>
+                    </a:lnB>
+                  </a:tcPr>
+                </a:tc>
+                <a:tc>
+                  <a:txBody>
+                    <a:bodyPr/>
+                    <a:lstStyle/>
+                    <a:p>
+                      <a:pPr algn="r" rtl="0" fontAlgn="b"/>
+                      <a:r>
+                        <a:rPr lang="en-US" sz="2200">
+                          <a:solidFill>
+                            <a:schemeClr val="bg1"/>
+                          </a:solidFill>
+                          <a:effectLst/>
+                          <a:latin typeface="Arial" panose="020B0604020202020204" pitchFamily="34" charset="0"/>
+                          <a:cs typeface="Arial" panose="020B0604020202020204" pitchFamily="34" charset="0"/>
+                        </a:rPr>
+                        <a:t>1.005</a:t>
+                      </a:r>
+                    </a:p>
+                  </a:txBody>
+                  <a:tcPr marL="28575" marR="28575" marT="19050" marB="19050" anchor="b">
+                    <a:lnL w="9525" cap="flat" cmpd="sng" algn="ctr">
+                      <a:solidFill>
+                        <a:srgbClr val="CCCCCC"/>
+                      </a:solidFill>
+                      <a:prstDash val="solid"/>
+                      <a:round/>
+                      <a:headEnd type="none" w="med" len="med"/>
+                      <a:tailEnd type="none" w="med" len="med"/>
+                    </a:lnL>
+                    <a:lnR w="9525" cap="flat" cmpd="sng" algn="ctr">
+                      <a:solidFill>
+                        <a:srgbClr val="CCCCCC"/>
+                      </a:solidFill>
+                      <a:prstDash val="solid"/>
+                      <a:round/>
+                      <a:headEnd type="none" w="med" len="med"/>
+                      <a:tailEnd type="none" w="med" len="med"/>
+                    </a:lnR>
+                    <a:lnT w="9525" cap="flat" cmpd="sng" algn="ctr">
+                      <a:solidFill>
+                        <a:srgbClr val="CCCCCC"/>
+                      </a:solidFill>
+                      <a:prstDash val="solid"/>
+                      <a:round/>
+                      <a:headEnd type="none" w="med" len="med"/>
+                      <a:tailEnd type="none" w="med" len="med"/>
+                    </a:lnT>
+                    <a:lnB w="9525" cap="flat" cmpd="sng" algn="ctr">
+                      <a:solidFill>
+                        <a:srgbClr val="CCCCCC"/>
+                      </a:solidFill>
+                      <a:prstDash val="solid"/>
+                      <a:round/>
+                      <a:headEnd type="none" w="med" len="med"/>
+                      <a:tailEnd type="none" w="med" len="med"/>
+                    </a:lnB>
+                  </a:tcPr>
+                </a:tc>
+                <a:extLst>
+                  <a:ext uri="{0D108BD9-81ED-4DB2-BD59-A6C34878D82A}">
+                    <a16:rowId xmlns:a16="http://schemas.microsoft.com/office/drawing/2014/main" val="4267560957"/>
+                  </a:ext>
+                </a:extLst>
+              </a:tr>
+              <a:tr h="777929">
+                <a:tc>
+                  <a:txBody>
+                    <a:bodyPr/>
+                    <a:lstStyle/>
+                    <a:p>
+                      <a:pPr algn="r" rtl="0" fontAlgn="b"/>
+                      <a:r>
+                        <a:rPr lang="en-US" sz="2200">
+                          <a:solidFill>
+                            <a:schemeClr val="bg1"/>
+                          </a:solidFill>
+                          <a:effectLst/>
+                          <a:latin typeface="Arial" panose="020B0604020202020204" pitchFamily="34" charset="0"/>
+                          <a:cs typeface="Arial" panose="020B0604020202020204" pitchFamily="34" charset="0"/>
+                        </a:rPr>
+                        <a:t>0.415</a:t>
+                      </a:r>
+                    </a:p>
+                  </a:txBody>
+                  <a:tcPr marL="28575" marR="28575" marT="19050" marB="19050" anchor="b">
+                    <a:lnL w="9525" cap="flat" cmpd="sng" algn="ctr">
+                      <a:solidFill>
+                        <a:srgbClr val="CCCCCC"/>
+                      </a:solidFill>
+                      <a:prstDash val="solid"/>
+                      <a:round/>
+                      <a:headEnd type="none" w="med" len="med"/>
+                      <a:tailEnd type="none" w="med" len="med"/>
+                    </a:lnL>
+                    <a:lnR w="9525" cap="flat" cmpd="sng" algn="ctr">
+                      <a:solidFill>
+                        <a:srgbClr val="CCCCCC"/>
+                      </a:solidFill>
+                      <a:prstDash val="solid"/>
+                      <a:round/>
+                      <a:headEnd type="none" w="med" len="med"/>
+                      <a:tailEnd type="none" w="med" len="med"/>
+                    </a:lnR>
+                    <a:lnT w="9525" cap="flat" cmpd="sng" algn="ctr">
+                      <a:solidFill>
+                        <a:srgbClr val="CCCCCC"/>
+                      </a:solidFill>
+                      <a:prstDash val="solid"/>
+                      <a:round/>
+                      <a:headEnd type="none" w="med" len="med"/>
+                      <a:tailEnd type="none" w="med" len="med"/>
+                    </a:lnT>
+                    <a:lnB w="9525" cap="flat" cmpd="sng" algn="ctr">
+                      <a:solidFill>
+                        <a:srgbClr val="CCCCCC"/>
+                      </a:solidFill>
+                      <a:prstDash val="solid"/>
+                      <a:round/>
+                      <a:headEnd type="none" w="med" len="med"/>
+                      <a:tailEnd type="none" w="med" len="med"/>
+                    </a:lnB>
+                  </a:tcPr>
+                </a:tc>
+                <a:tc>
+                  <a:txBody>
+                    <a:bodyPr/>
+                    <a:lstStyle/>
+                    <a:p>
+                      <a:pPr algn="r" rtl="0" fontAlgn="b"/>
+                      <a:r>
+                        <a:rPr lang="en-US" sz="2200">
+                          <a:solidFill>
+                            <a:schemeClr val="bg1"/>
+                          </a:solidFill>
+                          <a:effectLst/>
+                          <a:latin typeface="Arial" panose="020B0604020202020204" pitchFamily="34" charset="0"/>
+                          <a:cs typeface="Arial" panose="020B0604020202020204" pitchFamily="34" charset="0"/>
+                        </a:rPr>
+                        <a:t>1.065</a:t>
+                      </a:r>
+                    </a:p>
+                  </a:txBody>
+                  <a:tcPr marL="28575" marR="28575" marT="19050" marB="19050" anchor="b">
+                    <a:lnL w="9525" cap="flat" cmpd="sng" algn="ctr">
+                      <a:solidFill>
+                        <a:srgbClr val="CCCCCC"/>
+                      </a:solidFill>
+                      <a:prstDash val="solid"/>
+                      <a:round/>
+                      <a:headEnd type="none" w="med" len="med"/>
+                      <a:tailEnd type="none" w="med" len="med"/>
+                    </a:lnL>
+                    <a:lnR w="9525" cap="flat" cmpd="sng" algn="ctr">
+                      <a:solidFill>
+                        <a:srgbClr val="CCCCCC"/>
+                      </a:solidFill>
+                      <a:prstDash val="solid"/>
+                      <a:round/>
+                      <a:headEnd type="none" w="med" len="med"/>
+                      <a:tailEnd type="none" w="med" len="med"/>
+                    </a:lnR>
+                    <a:lnT w="9525" cap="flat" cmpd="sng" algn="ctr">
+                      <a:solidFill>
+                        <a:srgbClr val="CCCCCC"/>
+                      </a:solidFill>
+                      <a:prstDash val="solid"/>
+                      <a:round/>
+                      <a:headEnd type="none" w="med" len="med"/>
+                      <a:tailEnd type="none" w="med" len="med"/>
+                    </a:lnT>
+                    <a:lnB w="9525" cap="flat" cmpd="sng" algn="ctr">
+                      <a:solidFill>
+                        <a:srgbClr val="CCCCCC"/>
+                      </a:solidFill>
+                      <a:prstDash val="solid"/>
+                      <a:round/>
+                      <a:headEnd type="none" w="med" len="med"/>
+                      <a:tailEnd type="none" w="med" len="med"/>
+                    </a:lnB>
+                  </a:tcPr>
+                </a:tc>
+                <a:tc>
+                  <a:txBody>
+                    <a:bodyPr/>
+                    <a:lstStyle/>
+                    <a:p>
+                      <a:pPr algn="r" rtl="0" fontAlgn="b"/>
+                      <a:r>
+                        <a:rPr lang="en-US" sz="2200">
+                          <a:solidFill>
+                            <a:schemeClr val="bg1"/>
+                          </a:solidFill>
+                          <a:effectLst/>
+                          <a:latin typeface="Arial" panose="020B0604020202020204" pitchFamily="34" charset="0"/>
+                          <a:cs typeface="Arial" panose="020B0604020202020204" pitchFamily="34" charset="0"/>
+                        </a:rPr>
+                        <a:t>2.732</a:t>
+                      </a:r>
+                    </a:p>
+                  </a:txBody>
+                  <a:tcPr marL="28575" marR="28575" marT="19050" marB="19050" anchor="b">
+                    <a:lnL w="9525" cap="flat" cmpd="sng" algn="ctr">
+                      <a:solidFill>
+                        <a:srgbClr val="CCCCCC"/>
+                      </a:solidFill>
+                      <a:prstDash val="solid"/>
+                      <a:round/>
+                      <a:headEnd type="none" w="med" len="med"/>
+                      <a:tailEnd type="none" w="med" len="med"/>
+                    </a:lnL>
+                    <a:lnR w="9525" cap="flat" cmpd="sng" algn="ctr">
+                      <a:solidFill>
+                        <a:srgbClr val="CCCCCC"/>
+                      </a:solidFill>
+                      <a:prstDash val="solid"/>
+                      <a:round/>
+                      <a:headEnd type="none" w="med" len="med"/>
+                      <a:tailEnd type="none" w="med" len="med"/>
+                    </a:lnR>
+                    <a:lnT w="9525" cap="flat" cmpd="sng" algn="ctr">
+                      <a:solidFill>
+                        <a:srgbClr val="CCCCCC"/>
+                      </a:solidFill>
+                      <a:prstDash val="solid"/>
+                      <a:round/>
+                      <a:headEnd type="none" w="med" len="med"/>
+                      <a:tailEnd type="none" w="med" len="med"/>
+                    </a:lnT>
+                    <a:lnB w="9525" cap="flat" cmpd="sng" algn="ctr">
+                      <a:solidFill>
+                        <a:srgbClr val="CCCCCC"/>
+                      </a:solidFill>
+                      <a:prstDash val="solid"/>
+                      <a:round/>
+                      <a:headEnd type="none" w="med" len="med"/>
+                      <a:tailEnd type="none" w="med" len="med"/>
+                    </a:lnB>
+                  </a:tcPr>
+                </a:tc>
+                <a:extLst>
+                  <a:ext uri="{0D108BD9-81ED-4DB2-BD59-A6C34878D82A}">
+                    <a16:rowId xmlns:a16="http://schemas.microsoft.com/office/drawing/2014/main" val="3095506287"/>
+                  </a:ext>
+                </a:extLst>
+              </a:tr>
+              <a:tr h="1460990">
+                <a:tc>
+                  <a:txBody>
+                    <a:bodyPr/>
+                    <a:lstStyle/>
+                    <a:p>
+                      <a:pPr algn="r" rtl="0" fontAlgn="b"/>
+                      <a:r>
+                        <a:rPr lang="en-US" sz="2200" dirty="0">
+                          <a:solidFill>
+                            <a:schemeClr val="bg1"/>
+                          </a:solidFill>
+                          <a:effectLst/>
+                          <a:latin typeface="Arial" panose="020B0604020202020204" pitchFamily="34" charset="0"/>
+                          <a:cs typeface="Arial" panose="020B0604020202020204" pitchFamily="34" charset="0"/>
+                        </a:rPr>
+                        <a:t>0.293</a:t>
+                      </a:r>
+                    </a:p>
+                  </a:txBody>
+                  <a:tcPr marL="28575" marR="28575" marT="19050" marB="19050" anchor="b">
+                    <a:lnL w="9525" cap="flat" cmpd="sng" algn="ctr">
+                      <a:solidFill>
+                        <a:srgbClr val="CCCCCC"/>
+                      </a:solidFill>
+                      <a:prstDash val="solid"/>
+                      <a:round/>
+                      <a:headEnd type="none" w="med" len="med"/>
+                      <a:tailEnd type="none" w="med" len="med"/>
+                    </a:lnL>
+                    <a:lnR w="9525" cap="flat" cmpd="sng" algn="ctr">
+                      <a:solidFill>
+                        <a:srgbClr val="CCCCCC"/>
+                      </a:solidFill>
+                      <a:prstDash val="solid"/>
+                      <a:round/>
+                      <a:headEnd type="none" w="med" len="med"/>
+                      <a:tailEnd type="none" w="med" len="med"/>
+                    </a:lnR>
+                    <a:lnT w="9525" cap="flat" cmpd="sng" algn="ctr">
+                      <a:solidFill>
+                        <a:srgbClr val="CCCCCC"/>
+                      </a:solidFill>
+                      <a:prstDash val="solid"/>
+                      <a:round/>
+                      <a:headEnd type="none" w="med" len="med"/>
+                      <a:tailEnd type="none" w="med" len="med"/>
+                    </a:lnT>
+                    <a:lnB w="9525" cap="flat" cmpd="sng" algn="ctr">
+                      <a:solidFill>
+                        <a:srgbClr val="CCCCCC"/>
+                      </a:solidFill>
+                      <a:prstDash val="solid"/>
+                      <a:round/>
+                      <a:headEnd type="none" w="med" len="med"/>
+                      <a:tailEnd type="none" w="med" len="med"/>
+                    </a:lnB>
+                  </a:tcPr>
+                </a:tc>
+                <a:tc>
+                  <a:txBody>
+                    <a:bodyPr/>
+                    <a:lstStyle/>
+                    <a:p>
+                      <a:pPr algn="r" rtl="0" fontAlgn="b"/>
+                      <a:r>
+                        <a:rPr lang="en-US" sz="2200">
+                          <a:solidFill>
+                            <a:schemeClr val="bg1"/>
+                          </a:solidFill>
+                          <a:effectLst/>
+                          <a:latin typeface="Arial" panose="020B0604020202020204" pitchFamily="34" charset="0"/>
+                          <a:cs typeface="Arial" panose="020B0604020202020204" pitchFamily="34" charset="0"/>
+                        </a:rPr>
+                        <a:t>0.516</a:t>
+                      </a:r>
+                    </a:p>
+                  </a:txBody>
+                  <a:tcPr marL="28575" marR="28575" marT="19050" marB="19050" anchor="b">
+                    <a:lnL w="9525" cap="flat" cmpd="sng" algn="ctr">
+                      <a:solidFill>
+                        <a:srgbClr val="CCCCCC"/>
+                      </a:solidFill>
+                      <a:prstDash val="solid"/>
+                      <a:round/>
+                      <a:headEnd type="none" w="med" len="med"/>
+                      <a:tailEnd type="none" w="med" len="med"/>
+                    </a:lnL>
+                    <a:lnR w="9525" cap="flat" cmpd="sng" algn="ctr">
+                      <a:solidFill>
+                        <a:srgbClr val="CCCCCC"/>
+                      </a:solidFill>
+                      <a:prstDash val="solid"/>
+                      <a:round/>
+                      <a:headEnd type="none" w="med" len="med"/>
+                      <a:tailEnd type="none" w="med" len="med"/>
+                    </a:lnR>
+                    <a:lnT w="9525" cap="flat" cmpd="sng" algn="ctr">
+                      <a:solidFill>
+                        <a:srgbClr val="CCCCCC"/>
+                      </a:solidFill>
+                      <a:prstDash val="solid"/>
+                      <a:round/>
+                      <a:headEnd type="none" w="med" len="med"/>
+                      <a:tailEnd type="none" w="med" len="med"/>
+                    </a:lnT>
+                    <a:lnB w="9525" cap="flat" cmpd="sng" algn="ctr">
+                      <a:solidFill>
+                        <a:srgbClr val="CCCCCC"/>
+                      </a:solidFill>
+                      <a:prstDash val="solid"/>
+                      <a:round/>
+                      <a:headEnd type="none" w="med" len="med"/>
+                      <a:tailEnd type="none" w="med" len="med"/>
+                    </a:lnB>
+                  </a:tcPr>
+                </a:tc>
+                <a:tc>
+                  <a:txBody>
+                    <a:bodyPr/>
+                    <a:lstStyle/>
+                    <a:p>
+                      <a:pPr algn="r" rtl="0" fontAlgn="b"/>
+                      <a:r>
+                        <a:rPr lang="en-US" sz="2200" dirty="0">
+                          <a:solidFill>
+                            <a:schemeClr val="bg1"/>
+                          </a:solidFill>
+                          <a:effectLst/>
+                          <a:latin typeface="Arial" panose="020B0604020202020204" pitchFamily="34" charset="0"/>
+                          <a:cs typeface="Arial" panose="020B0604020202020204" pitchFamily="34" charset="0"/>
+                        </a:rPr>
+                        <a:t>0.732</a:t>
+                      </a:r>
+                    </a:p>
+                  </a:txBody>
+                  <a:tcPr marL="28575" marR="28575" marT="19050" marB="19050" anchor="b">
+                    <a:lnL w="9525" cap="flat" cmpd="sng" algn="ctr">
+                      <a:solidFill>
+                        <a:srgbClr val="CCCCCC"/>
+                      </a:solidFill>
+                      <a:prstDash val="solid"/>
+                      <a:round/>
+                      <a:headEnd type="none" w="med" len="med"/>
+                      <a:tailEnd type="none" w="med" len="med"/>
+                    </a:lnL>
+                    <a:lnR w="9525" cap="flat" cmpd="sng" algn="ctr">
+                      <a:solidFill>
+                        <a:srgbClr val="CCCCCC"/>
+                      </a:solidFill>
+                      <a:prstDash val="solid"/>
+                      <a:round/>
+                      <a:headEnd type="none" w="med" len="med"/>
+                      <a:tailEnd type="none" w="med" len="med"/>
+                    </a:lnR>
+                    <a:lnT w="9525" cap="flat" cmpd="sng" algn="ctr">
+                      <a:solidFill>
+                        <a:srgbClr val="CCCCCC"/>
+                      </a:solidFill>
+                      <a:prstDash val="solid"/>
+                      <a:round/>
+                      <a:headEnd type="none" w="med" len="med"/>
+                      <a:tailEnd type="none" w="med" len="med"/>
+                    </a:lnT>
+                    <a:lnB w="9525" cap="flat" cmpd="sng" algn="ctr">
+                      <a:solidFill>
+                        <a:srgbClr val="CCCCCC"/>
+                      </a:solidFill>
+                      <a:prstDash val="solid"/>
+                      <a:round/>
+                      <a:headEnd type="none" w="med" len="med"/>
+                      <a:tailEnd type="none" w="med" len="med"/>
+                    </a:lnB>
+                  </a:tcPr>
+                </a:tc>
+                <a:extLst>
+                  <a:ext uri="{0D108BD9-81ED-4DB2-BD59-A6C34878D82A}">
+                    <a16:rowId xmlns:a16="http://schemas.microsoft.com/office/drawing/2014/main" val="2193129136"/>
+                  </a:ext>
+                </a:extLst>
+              </a:tr>
+            </a:tbl>
+          </a:graphicData>
+        </a:graphic>
+      </p:graphicFrame>
     </p:spTree>
     <p:extLst>
       <p:ext uri="{BB962C8B-B14F-4D97-AF65-F5344CB8AC3E}">
-        <p14:creationId xmlns:p14="http://schemas.microsoft.com/office/powerpoint/2010/main" val="1526971153"/>
+        <p14:creationId xmlns:p14="http://schemas.microsoft.com/office/powerpoint/2010/main" val="1221216393"/>
       </p:ext>
     </p:extLst>
   </p:cSld>
@@ -40183,8 +40968,8 @@
           </a:p>
         </p:txBody>
       </p:sp>
-      <mc:AlternateContent xmlns:mc="http://schemas.openxmlformats.org/markup-compatibility/2006">
-        <mc:Choice xmlns:a14="http://schemas.microsoft.com/office/drawing/2010/main" Requires="a14">
+      <mc:AlternateContent xmlns:mc="http://schemas.openxmlformats.org/markup-compatibility/2006" xmlns:a14="http://schemas.microsoft.com/office/drawing/2010/main">
+        <mc:Choice Requires="a14">
           <p:sp>
             <p:nvSpPr>
               <p:cNvPr id="3" name="TextBox 2"/>
@@ -40420,7 +41205,7 @@
             </p:txBody>
           </p:sp>
         </mc:Choice>
-        <mc:Fallback>
+        <mc:Fallback xmlns="">
           <p:sp>
             <p:nvSpPr>
               <p:cNvPr id="3" name="TextBox 2"/>
@@ -40459,8 +41244,8 @@
           </p:sp>
         </mc:Fallback>
       </mc:AlternateContent>
-      <mc:AlternateContent xmlns:mc="http://schemas.openxmlformats.org/markup-compatibility/2006">
-        <mc:Choice xmlns:a14="http://schemas.microsoft.com/office/drawing/2010/main" Requires="a14">
+      <mc:AlternateContent xmlns:mc="http://schemas.openxmlformats.org/markup-compatibility/2006" xmlns:a14="http://schemas.microsoft.com/office/drawing/2010/main">
+        <mc:Choice Requires="a14">
           <p:sp>
             <p:nvSpPr>
               <p:cNvPr id="8" name="TextBox 7"/>
@@ -40683,7 +41468,7 @@
             </p:txBody>
           </p:sp>
         </mc:Choice>
-        <mc:Fallback>
+        <mc:Fallback xmlns="">
           <p:sp>
             <p:nvSpPr>
               <p:cNvPr id="8" name="TextBox 7"/>
@@ -40722,8 +41507,8 @@
           </p:sp>
         </mc:Fallback>
       </mc:AlternateContent>
-      <mc:AlternateContent xmlns:mc="http://schemas.openxmlformats.org/markup-compatibility/2006">
-        <mc:Choice xmlns:a14="http://schemas.microsoft.com/office/drawing/2010/main" Requires="a14">
+      <mc:AlternateContent xmlns:mc="http://schemas.openxmlformats.org/markup-compatibility/2006" xmlns:a14="http://schemas.microsoft.com/office/drawing/2010/main">
+        <mc:Choice Requires="a14">
           <p:sp>
             <p:nvSpPr>
               <p:cNvPr id="5" name="TextBox 4"/>
@@ -40919,7 +41704,7 @@
             </p:txBody>
           </p:sp>
         </mc:Choice>
-        <mc:Fallback>
+        <mc:Fallback xmlns="">
           <p:sp>
             <p:nvSpPr>
               <p:cNvPr id="5" name="TextBox 4"/>
@@ -42735,8 +43520,8 @@
           </a:extLst>
         </p:spPr>
       </p:cxnSp>
-      <mc:AlternateContent xmlns:mc="http://schemas.openxmlformats.org/markup-compatibility/2006">
-        <mc:Choice xmlns:a14="http://schemas.microsoft.com/office/drawing/2010/main" Requires="a14">
+      <mc:AlternateContent xmlns:mc="http://schemas.openxmlformats.org/markup-compatibility/2006" xmlns:a14="http://schemas.microsoft.com/office/drawing/2010/main">
+        <mc:Choice Requires="a14">
           <p:sp>
             <p:nvSpPr>
               <p:cNvPr id="3" name="Rectangle 2"/>
@@ -42844,7 +43629,7 @@
             </p:txBody>
           </p:sp>
         </mc:Choice>
-        <mc:Fallback>
+        <mc:Fallback xmlns="">
           <p:sp>
             <p:nvSpPr>
               <p:cNvPr id="3" name="Rectangle 2"/>

</xml_diff>